<commit_message>
Reteste da parametrização - marcado com " 21-09-13- 12 h 22 m"
</commit_message>
<xml_diff>
--- a/Apresentacao 3/ApresentacaoGA.pptx
+++ b/Apresentacao 3/ApresentacaoGA.pptx
@@ -4,6 +4,9 @@
   <p:sldMasterIdLst>
     <p:sldMasterId id="2147483759" r:id="rId1"/>
   </p:sldMasterIdLst>
+  <p:notesMasterIdLst>
+    <p:notesMasterId r:id="rId31"/>
+  </p:notesMasterIdLst>
   <p:sldIdLst>
     <p:sldId id="256" r:id="rId2"/>
     <p:sldId id="257" r:id="rId3"/>
@@ -23,16 +26,17 @@
     <p:sldId id="315" r:id="rId17"/>
     <p:sldId id="269" r:id="rId18"/>
     <p:sldId id="304" r:id="rId19"/>
-    <p:sldId id="307" r:id="rId20"/>
-    <p:sldId id="308" r:id="rId21"/>
-    <p:sldId id="310" r:id="rId22"/>
-    <p:sldId id="311" r:id="rId23"/>
-    <p:sldId id="313" r:id="rId24"/>
-    <p:sldId id="314" r:id="rId25"/>
-    <p:sldId id="312" r:id="rId26"/>
-    <p:sldId id="316" r:id="rId27"/>
-    <p:sldId id="284" r:id="rId28"/>
-    <p:sldId id="285" r:id="rId29"/>
+    <p:sldId id="317" r:id="rId20"/>
+    <p:sldId id="307" r:id="rId21"/>
+    <p:sldId id="308" r:id="rId22"/>
+    <p:sldId id="310" r:id="rId23"/>
+    <p:sldId id="311" r:id="rId24"/>
+    <p:sldId id="313" r:id="rId25"/>
+    <p:sldId id="314" r:id="rId26"/>
+    <p:sldId id="312" r:id="rId27"/>
+    <p:sldId id="316" r:id="rId28"/>
+    <p:sldId id="284" r:id="rId29"/>
+    <p:sldId id="285" r:id="rId30"/>
   </p:sldIdLst>
   <p:sldSz cx="12192000" cy="6858000"/>
   <p:notesSz cx="6858000" cy="9144000"/>
@@ -9689,6 +9693,608 @@
 </dgm:styleDef>
 </file>
 
+<file path=ppt/notesMasters/notesMaster1.xml><?xml version="1.0" encoding="utf-8"?>
+<p:notesMaster xmlns:a="http://schemas.openxmlformats.org/drawingml/2006/main" xmlns:r="http://schemas.openxmlformats.org/officeDocument/2006/relationships" xmlns:p="http://schemas.openxmlformats.org/presentationml/2006/main">
+  <p:cSld>
+    <p:bg>
+      <p:bgRef idx="1001">
+        <a:schemeClr val="bg1"/>
+      </p:bgRef>
+    </p:bg>
+    <p:spTree>
+      <p:nvGrpSpPr>
+        <p:cNvPr id="1" name=""/>
+        <p:cNvGrpSpPr/>
+        <p:nvPr/>
+      </p:nvGrpSpPr>
+      <p:grpSpPr>
+        <a:xfrm>
+          <a:off x="0" y="0"/>
+          <a:ext cx="0" cy="0"/>
+          <a:chOff x="0" y="0"/>
+          <a:chExt cx="0" cy="0"/>
+        </a:xfrm>
+      </p:grpSpPr>
+      <p:sp>
+        <p:nvSpPr>
+          <p:cNvPr id="2" name="Header Placeholder 1"/>
+          <p:cNvSpPr>
+            <a:spLocks noGrp="1"/>
+          </p:cNvSpPr>
+          <p:nvPr>
+            <p:ph type="hdr" sz="quarter"/>
+          </p:nvPr>
+        </p:nvSpPr>
+        <p:spPr>
+          <a:xfrm>
+            <a:off x="0" y="0"/>
+            <a:ext cx="2971800" cy="458788"/>
+          </a:xfrm>
+          <a:prstGeom prst="rect">
+            <a:avLst/>
+          </a:prstGeom>
+        </p:spPr>
+        <p:txBody>
+          <a:bodyPr vert="horz" lIns="91440" tIns="45720" rIns="91440" bIns="45720" rtlCol="0"/>
+          <a:lstStyle>
+            <a:lvl1pPr algn="l">
+              <a:defRPr sz="1200"/>
+            </a:lvl1pPr>
+          </a:lstStyle>
+          <a:p>
+            <a:endParaRPr lang="pt-BR"/>
+          </a:p>
+        </p:txBody>
+      </p:sp>
+      <p:sp>
+        <p:nvSpPr>
+          <p:cNvPr id="3" name="Date Placeholder 2"/>
+          <p:cNvSpPr>
+            <a:spLocks noGrp="1"/>
+          </p:cNvSpPr>
+          <p:nvPr>
+            <p:ph type="dt" idx="1"/>
+          </p:nvPr>
+        </p:nvSpPr>
+        <p:spPr>
+          <a:xfrm>
+            <a:off x="3884613" y="0"/>
+            <a:ext cx="2971800" cy="458788"/>
+          </a:xfrm>
+          <a:prstGeom prst="rect">
+            <a:avLst/>
+          </a:prstGeom>
+        </p:spPr>
+        <p:txBody>
+          <a:bodyPr vert="horz" lIns="91440" tIns="45720" rIns="91440" bIns="45720" rtlCol="0"/>
+          <a:lstStyle>
+            <a:lvl1pPr algn="r">
+              <a:defRPr sz="1200"/>
+            </a:lvl1pPr>
+          </a:lstStyle>
+          <a:p>
+            <a:fld id="{8D41C0B1-3C46-417C-AB0C-BD464671FED7}" type="datetimeFigureOut">
+              <a:rPr lang="pt-BR" smtClean="0"/>
+              <a:t>10/09/2021</a:t>
+            </a:fld>
+            <a:endParaRPr lang="pt-BR"/>
+          </a:p>
+        </p:txBody>
+      </p:sp>
+      <p:sp>
+        <p:nvSpPr>
+          <p:cNvPr id="4" name="Slide Image Placeholder 3"/>
+          <p:cNvSpPr>
+            <a:spLocks noGrp="1" noRot="1" noChangeAspect="1"/>
+          </p:cNvSpPr>
+          <p:nvPr>
+            <p:ph type="sldImg" idx="2"/>
+          </p:nvPr>
+        </p:nvSpPr>
+        <p:spPr>
+          <a:xfrm>
+            <a:off x="685800" y="1143000"/>
+            <a:ext cx="5486400" cy="3086100"/>
+          </a:xfrm>
+          <a:prstGeom prst="rect">
+            <a:avLst/>
+          </a:prstGeom>
+          <a:noFill/>
+          <a:ln w="12700">
+            <a:solidFill>
+              <a:prstClr val="black"/>
+            </a:solidFill>
+          </a:ln>
+        </p:spPr>
+        <p:txBody>
+          <a:bodyPr vert="horz" lIns="91440" tIns="45720" rIns="91440" bIns="45720" rtlCol="0" anchor="ctr"/>
+          <a:lstStyle/>
+          <a:p>
+            <a:endParaRPr lang="pt-BR"/>
+          </a:p>
+        </p:txBody>
+      </p:sp>
+      <p:sp>
+        <p:nvSpPr>
+          <p:cNvPr id="5" name="Notes Placeholder 4"/>
+          <p:cNvSpPr>
+            <a:spLocks noGrp="1"/>
+          </p:cNvSpPr>
+          <p:nvPr>
+            <p:ph type="body" sz="quarter" idx="3"/>
+          </p:nvPr>
+        </p:nvSpPr>
+        <p:spPr>
+          <a:xfrm>
+            <a:off x="685800" y="4400550"/>
+            <a:ext cx="5486400" cy="3600450"/>
+          </a:xfrm>
+          <a:prstGeom prst="rect">
+            <a:avLst/>
+          </a:prstGeom>
+        </p:spPr>
+        <p:txBody>
+          <a:bodyPr vert="horz" lIns="91440" tIns="45720" rIns="91440" bIns="45720" rtlCol="0"/>
+          <a:lstStyle/>
+          <a:p>
+            <a:pPr lvl="0"/>
+            <a:r>
+              <a:rPr lang="en-US"/>
+              <a:t>Click to edit Master text styles</a:t>
+            </a:r>
+          </a:p>
+          <a:p>
+            <a:pPr lvl="1"/>
+            <a:r>
+              <a:rPr lang="en-US"/>
+              <a:t>Second level</a:t>
+            </a:r>
+          </a:p>
+          <a:p>
+            <a:pPr lvl="2"/>
+            <a:r>
+              <a:rPr lang="en-US"/>
+              <a:t>Third level</a:t>
+            </a:r>
+          </a:p>
+          <a:p>
+            <a:pPr lvl="3"/>
+            <a:r>
+              <a:rPr lang="en-US"/>
+              <a:t>Fourth level</a:t>
+            </a:r>
+          </a:p>
+          <a:p>
+            <a:pPr lvl="4"/>
+            <a:r>
+              <a:rPr lang="en-US"/>
+              <a:t>Fifth level</a:t>
+            </a:r>
+            <a:endParaRPr lang="pt-BR"/>
+          </a:p>
+        </p:txBody>
+      </p:sp>
+      <p:sp>
+        <p:nvSpPr>
+          <p:cNvPr id="6" name="Footer Placeholder 5"/>
+          <p:cNvSpPr>
+            <a:spLocks noGrp="1"/>
+          </p:cNvSpPr>
+          <p:nvPr>
+            <p:ph type="ftr" sz="quarter" idx="4"/>
+          </p:nvPr>
+        </p:nvSpPr>
+        <p:spPr>
+          <a:xfrm>
+            <a:off x="0" y="8685213"/>
+            <a:ext cx="2971800" cy="458787"/>
+          </a:xfrm>
+          <a:prstGeom prst="rect">
+            <a:avLst/>
+          </a:prstGeom>
+        </p:spPr>
+        <p:txBody>
+          <a:bodyPr vert="horz" lIns="91440" tIns="45720" rIns="91440" bIns="45720" rtlCol="0" anchor="b"/>
+          <a:lstStyle>
+            <a:lvl1pPr algn="l">
+              <a:defRPr sz="1200"/>
+            </a:lvl1pPr>
+          </a:lstStyle>
+          <a:p>
+            <a:endParaRPr lang="pt-BR"/>
+          </a:p>
+        </p:txBody>
+      </p:sp>
+      <p:sp>
+        <p:nvSpPr>
+          <p:cNvPr id="7" name="Slide Number Placeholder 6"/>
+          <p:cNvSpPr>
+            <a:spLocks noGrp="1"/>
+          </p:cNvSpPr>
+          <p:nvPr>
+            <p:ph type="sldNum" sz="quarter" idx="5"/>
+          </p:nvPr>
+        </p:nvSpPr>
+        <p:spPr>
+          <a:xfrm>
+            <a:off x="3884613" y="8685213"/>
+            <a:ext cx="2971800" cy="458787"/>
+          </a:xfrm>
+          <a:prstGeom prst="rect">
+            <a:avLst/>
+          </a:prstGeom>
+        </p:spPr>
+        <p:txBody>
+          <a:bodyPr vert="horz" lIns="91440" tIns="45720" rIns="91440" bIns="45720" rtlCol="0" anchor="b"/>
+          <a:lstStyle>
+            <a:lvl1pPr algn="r">
+              <a:defRPr sz="1200"/>
+            </a:lvl1pPr>
+          </a:lstStyle>
+          <a:p>
+            <a:fld id="{E604196E-A6EB-4C4F-8FD4-A43D6A929AA5}" type="slidenum">
+              <a:rPr lang="pt-BR" smtClean="0"/>
+              <a:t>‹#›</a:t>
+            </a:fld>
+            <a:endParaRPr lang="pt-BR"/>
+          </a:p>
+        </p:txBody>
+      </p:sp>
+    </p:spTree>
+    <p:extLst>
+      <p:ext uri="{BB962C8B-B14F-4D97-AF65-F5344CB8AC3E}">
+        <p14:creationId xmlns:p14="http://schemas.microsoft.com/office/powerpoint/2010/main" val="3811798153"/>
+      </p:ext>
+    </p:extLst>
+  </p:cSld>
+  <p:clrMap bg1="lt1" tx1="dk1" bg2="lt2" tx2="dk2" accent1="accent1" accent2="accent2" accent3="accent3" accent4="accent4" accent5="accent5" accent6="accent6" hlink="hlink" folHlink="folHlink"/>
+  <p:notesStyle>
+    <a:lvl1pPr marL="0" algn="l" defTabSz="914400" rtl="0" eaLnBrk="1" latinLnBrk="0" hangingPunct="1">
+      <a:defRPr sz="1200" kern="1200">
+        <a:solidFill>
+          <a:schemeClr val="tx1"/>
+        </a:solidFill>
+        <a:latin typeface="+mn-lt"/>
+        <a:ea typeface="+mn-ea"/>
+        <a:cs typeface="+mn-cs"/>
+      </a:defRPr>
+    </a:lvl1pPr>
+    <a:lvl2pPr marL="457200" algn="l" defTabSz="914400" rtl="0" eaLnBrk="1" latinLnBrk="0" hangingPunct="1">
+      <a:defRPr sz="1200" kern="1200">
+        <a:solidFill>
+          <a:schemeClr val="tx1"/>
+        </a:solidFill>
+        <a:latin typeface="+mn-lt"/>
+        <a:ea typeface="+mn-ea"/>
+        <a:cs typeface="+mn-cs"/>
+      </a:defRPr>
+    </a:lvl2pPr>
+    <a:lvl3pPr marL="914400" algn="l" defTabSz="914400" rtl="0" eaLnBrk="1" latinLnBrk="0" hangingPunct="1">
+      <a:defRPr sz="1200" kern="1200">
+        <a:solidFill>
+          <a:schemeClr val="tx1"/>
+        </a:solidFill>
+        <a:latin typeface="+mn-lt"/>
+        <a:ea typeface="+mn-ea"/>
+        <a:cs typeface="+mn-cs"/>
+      </a:defRPr>
+    </a:lvl3pPr>
+    <a:lvl4pPr marL="1371600" algn="l" defTabSz="914400" rtl="0" eaLnBrk="1" latinLnBrk="0" hangingPunct="1">
+      <a:defRPr sz="1200" kern="1200">
+        <a:solidFill>
+          <a:schemeClr val="tx1"/>
+        </a:solidFill>
+        <a:latin typeface="+mn-lt"/>
+        <a:ea typeface="+mn-ea"/>
+        <a:cs typeface="+mn-cs"/>
+      </a:defRPr>
+    </a:lvl4pPr>
+    <a:lvl5pPr marL="1828800" algn="l" defTabSz="914400" rtl="0" eaLnBrk="1" latinLnBrk="0" hangingPunct="1">
+      <a:defRPr sz="1200" kern="1200">
+        <a:solidFill>
+          <a:schemeClr val="tx1"/>
+        </a:solidFill>
+        <a:latin typeface="+mn-lt"/>
+        <a:ea typeface="+mn-ea"/>
+        <a:cs typeface="+mn-cs"/>
+      </a:defRPr>
+    </a:lvl5pPr>
+    <a:lvl6pPr marL="2286000" algn="l" defTabSz="914400" rtl="0" eaLnBrk="1" latinLnBrk="0" hangingPunct="1">
+      <a:defRPr sz="1200" kern="1200">
+        <a:solidFill>
+          <a:schemeClr val="tx1"/>
+        </a:solidFill>
+        <a:latin typeface="+mn-lt"/>
+        <a:ea typeface="+mn-ea"/>
+        <a:cs typeface="+mn-cs"/>
+      </a:defRPr>
+    </a:lvl6pPr>
+    <a:lvl7pPr marL="2743200" algn="l" defTabSz="914400" rtl="0" eaLnBrk="1" latinLnBrk="0" hangingPunct="1">
+      <a:defRPr sz="1200" kern="1200">
+        <a:solidFill>
+          <a:schemeClr val="tx1"/>
+        </a:solidFill>
+        <a:latin typeface="+mn-lt"/>
+        <a:ea typeface="+mn-ea"/>
+        <a:cs typeface="+mn-cs"/>
+      </a:defRPr>
+    </a:lvl7pPr>
+    <a:lvl8pPr marL="3200400" algn="l" defTabSz="914400" rtl="0" eaLnBrk="1" latinLnBrk="0" hangingPunct="1">
+      <a:defRPr sz="1200" kern="1200">
+        <a:solidFill>
+          <a:schemeClr val="tx1"/>
+        </a:solidFill>
+        <a:latin typeface="+mn-lt"/>
+        <a:ea typeface="+mn-ea"/>
+        <a:cs typeface="+mn-cs"/>
+      </a:defRPr>
+    </a:lvl8pPr>
+    <a:lvl9pPr marL="3657600" algn="l" defTabSz="914400" rtl="0" eaLnBrk="1" latinLnBrk="0" hangingPunct="1">
+      <a:defRPr sz="1200" kern="1200">
+        <a:solidFill>
+          <a:schemeClr val="tx1"/>
+        </a:solidFill>
+        <a:latin typeface="+mn-lt"/>
+        <a:ea typeface="+mn-ea"/>
+        <a:cs typeface="+mn-cs"/>
+      </a:defRPr>
+    </a:lvl9pPr>
+  </p:notesStyle>
+</p:notesMaster>
+</file>
+
+<file path=ppt/notesSlides/notesSlide1.xml><?xml version="1.0" encoding="utf-8"?>
+<p:notes xmlns:a="http://schemas.openxmlformats.org/drawingml/2006/main" xmlns:r="http://schemas.openxmlformats.org/officeDocument/2006/relationships" xmlns:p="http://schemas.openxmlformats.org/presentationml/2006/main">
+  <p:cSld>
+    <p:spTree>
+      <p:nvGrpSpPr>
+        <p:cNvPr id="1" name=""/>
+        <p:cNvGrpSpPr/>
+        <p:nvPr/>
+      </p:nvGrpSpPr>
+      <p:grpSpPr>
+        <a:xfrm>
+          <a:off x="0" y="0"/>
+          <a:ext cx="0" cy="0"/>
+          <a:chOff x="0" y="0"/>
+          <a:chExt cx="0" cy="0"/>
+        </a:xfrm>
+      </p:grpSpPr>
+      <p:sp>
+        <p:nvSpPr>
+          <p:cNvPr id="2" name="Slide Image Placeholder 1"/>
+          <p:cNvSpPr>
+            <a:spLocks noGrp="1" noRot="1" noChangeAspect="1"/>
+          </p:cNvSpPr>
+          <p:nvPr>
+            <p:ph type="sldImg"/>
+          </p:nvPr>
+        </p:nvSpPr>
+        <p:spPr/>
+      </p:sp>
+      <p:sp>
+        <p:nvSpPr>
+          <p:cNvPr id="3" name="Notes Placeholder 2"/>
+          <p:cNvSpPr>
+            <a:spLocks noGrp="1"/>
+          </p:cNvSpPr>
+          <p:nvPr>
+            <p:ph type="body" idx="1"/>
+          </p:nvPr>
+        </p:nvSpPr>
+        <p:spPr/>
+        <p:txBody>
+          <a:bodyPr/>
+          <a:lstStyle/>
+          <a:p>
+            <a:endParaRPr lang="pt-BR" dirty="0"/>
+          </a:p>
+        </p:txBody>
+      </p:sp>
+      <p:sp>
+        <p:nvSpPr>
+          <p:cNvPr id="4" name="Slide Number Placeholder 3"/>
+          <p:cNvSpPr>
+            <a:spLocks noGrp="1"/>
+          </p:cNvSpPr>
+          <p:nvPr>
+            <p:ph type="sldNum" sz="quarter" idx="5"/>
+          </p:nvPr>
+        </p:nvSpPr>
+        <p:spPr/>
+        <p:txBody>
+          <a:bodyPr/>
+          <a:lstStyle/>
+          <a:p>
+            <a:fld id="{E604196E-A6EB-4C4F-8FD4-A43D6A929AA5}" type="slidenum">
+              <a:rPr lang="pt-BR" smtClean="0"/>
+              <a:t>17</a:t>
+            </a:fld>
+            <a:endParaRPr lang="pt-BR"/>
+          </a:p>
+        </p:txBody>
+      </p:sp>
+    </p:spTree>
+    <p:extLst>
+      <p:ext uri="{BB962C8B-B14F-4D97-AF65-F5344CB8AC3E}">
+        <p14:creationId xmlns:p14="http://schemas.microsoft.com/office/powerpoint/2010/main" val="734999882"/>
+      </p:ext>
+    </p:extLst>
+  </p:cSld>
+  <p:clrMapOvr>
+    <a:masterClrMapping/>
+  </p:clrMapOvr>
+</p:notes>
+</file>
+
+<file path=ppt/notesSlides/notesSlide2.xml><?xml version="1.0" encoding="utf-8"?>
+<p:notes xmlns:a="http://schemas.openxmlformats.org/drawingml/2006/main" xmlns:r="http://schemas.openxmlformats.org/officeDocument/2006/relationships" xmlns:p="http://schemas.openxmlformats.org/presentationml/2006/main">
+  <p:cSld>
+    <p:spTree>
+      <p:nvGrpSpPr>
+        <p:cNvPr id="1" name=""/>
+        <p:cNvGrpSpPr/>
+        <p:nvPr/>
+      </p:nvGrpSpPr>
+      <p:grpSpPr>
+        <a:xfrm>
+          <a:off x="0" y="0"/>
+          <a:ext cx="0" cy="0"/>
+          <a:chOff x="0" y="0"/>
+          <a:chExt cx="0" cy="0"/>
+        </a:xfrm>
+      </p:grpSpPr>
+      <p:sp>
+        <p:nvSpPr>
+          <p:cNvPr id="2" name="Slide Image Placeholder 1"/>
+          <p:cNvSpPr>
+            <a:spLocks noGrp="1" noRot="1" noChangeAspect="1"/>
+          </p:cNvSpPr>
+          <p:nvPr>
+            <p:ph type="sldImg"/>
+          </p:nvPr>
+        </p:nvSpPr>
+        <p:spPr/>
+      </p:sp>
+      <p:sp>
+        <p:nvSpPr>
+          <p:cNvPr id="3" name="Notes Placeholder 2"/>
+          <p:cNvSpPr>
+            <a:spLocks noGrp="1"/>
+          </p:cNvSpPr>
+          <p:nvPr>
+            <p:ph type="body" idx="1"/>
+          </p:nvPr>
+        </p:nvSpPr>
+        <p:spPr/>
+        <p:txBody>
+          <a:bodyPr/>
+          <a:lstStyle/>
+          <a:p>
+            <a:endParaRPr lang="pt-BR" dirty="0"/>
+          </a:p>
+        </p:txBody>
+      </p:sp>
+      <p:sp>
+        <p:nvSpPr>
+          <p:cNvPr id="4" name="Slide Number Placeholder 3"/>
+          <p:cNvSpPr>
+            <a:spLocks noGrp="1"/>
+          </p:cNvSpPr>
+          <p:nvPr>
+            <p:ph type="sldNum" sz="quarter" idx="5"/>
+          </p:nvPr>
+        </p:nvSpPr>
+        <p:spPr/>
+        <p:txBody>
+          <a:bodyPr/>
+          <a:lstStyle/>
+          <a:p>
+            <a:fld id="{E604196E-A6EB-4C4F-8FD4-A43D6A929AA5}" type="slidenum">
+              <a:rPr lang="pt-BR" smtClean="0"/>
+              <a:t>20</a:t>
+            </a:fld>
+            <a:endParaRPr lang="pt-BR"/>
+          </a:p>
+        </p:txBody>
+      </p:sp>
+    </p:spTree>
+    <p:extLst>
+      <p:ext uri="{BB962C8B-B14F-4D97-AF65-F5344CB8AC3E}">
+        <p14:creationId xmlns:p14="http://schemas.microsoft.com/office/powerpoint/2010/main" val="2009859090"/>
+      </p:ext>
+    </p:extLst>
+  </p:cSld>
+  <p:clrMapOvr>
+    <a:masterClrMapping/>
+  </p:clrMapOvr>
+</p:notes>
+</file>
+
+<file path=ppt/notesSlides/notesSlide3.xml><?xml version="1.0" encoding="utf-8"?>
+<p:notes xmlns:a="http://schemas.openxmlformats.org/drawingml/2006/main" xmlns:r="http://schemas.openxmlformats.org/officeDocument/2006/relationships" xmlns:p="http://schemas.openxmlformats.org/presentationml/2006/main">
+  <p:cSld>
+    <p:spTree>
+      <p:nvGrpSpPr>
+        <p:cNvPr id="1" name=""/>
+        <p:cNvGrpSpPr/>
+        <p:nvPr/>
+      </p:nvGrpSpPr>
+      <p:grpSpPr>
+        <a:xfrm>
+          <a:off x="0" y="0"/>
+          <a:ext cx="0" cy="0"/>
+          <a:chOff x="0" y="0"/>
+          <a:chExt cx="0" cy="0"/>
+        </a:xfrm>
+      </p:grpSpPr>
+      <p:sp>
+        <p:nvSpPr>
+          <p:cNvPr id="2" name="Slide Image Placeholder 1"/>
+          <p:cNvSpPr>
+            <a:spLocks noGrp="1" noRot="1" noChangeAspect="1"/>
+          </p:cNvSpPr>
+          <p:nvPr>
+            <p:ph type="sldImg"/>
+          </p:nvPr>
+        </p:nvSpPr>
+        <p:spPr/>
+      </p:sp>
+      <p:sp>
+        <p:nvSpPr>
+          <p:cNvPr id="3" name="Notes Placeholder 2"/>
+          <p:cNvSpPr>
+            <a:spLocks noGrp="1"/>
+          </p:cNvSpPr>
+          <p:nvPr>
+            <p:ph type="body" idx="1"/>
+          </p:nvPr>
+        </p:nvSpPr>
+        <p:spPr/>
+        <p:txBody>
+          <a:bodyPr/>
+          <a:lstStyle/>
+          <a:p>
+            <a:endParaRPr lang="pt-BR" dirty="0"/>
+          </a:p>
+        </p:txBody>
+      </p:sp>
+      <p:sp>
+        <p:nvSpPr>
+          <p:cNvPr id="4" name="Slide Number Placeholder 3"/>
+          <p:cNvSpPr>
+            <a:spLocks noGrp="1"/>
+          </p:cNvSpPr>
+          <p:nvPr>
+            <p:ph type="sldNum" sz="quarter" idx="5"/>
+          </p:nvPr>
+        </p:nvSpPr>
+        <p:spPr/>
+        <p:txBody>
+          <a:bodyPr/>
+          <a:lstStyle/>
+          <a:p>
+            <a:fld id="{E604196E-A6EB-4C4F-8FD4-A43D6A929AA5}" type="slidenum">
+              <a:rPr lang="pt-BR" smtClean="0"/>
+              <a:t>22</a:t>
+            </a:fld>
+            <a:endParaRPr lang="pt-BR"/>
+          </a:p>
+        </p:txBody>
+      </p:sp>
+    </p:spTree>
+    <p:extLst>
+      <p:ext uri="{BB962C8B-B14F-4D97-AF65-F5344CB8AC3E}">
+        <p14:creationId xmlns:p14="http://schemas.microsoft.com/office/powerpoint/2010/main" val="2811493327"/>
+      </p:ext>
+    </p:extLst>
+  </p:cSld>
+  <p:clrMapOvr>
+    <a:masterClrMapping/>
+  </p:clrMapOvr>
+</p:notes>
+</file>
+
 <file path=ppt/slideLayouts/slideLayout1.xml><?xml version="1.0" encoding="utf-8"?>
 <p:sldLayout xmlns:a="http://schemas.openxmlformats.org/drawingml/2006/main" xmlns:r="http://schemas.openxmlformats.org/officeDocument/2006/relationships" xmlns:p="http://schemas.openxmlformats.org/presentationml/2006/main" type="title" preserve="1">
   <p:cSld name="Title Slide">
@@ -9836,7 +10442,7 @@
           <a:p>
             <a:fld id="{6AD6EE87-EBD5-4F12-A48A-63ACA297AC8F}" type="datetimeFigureOut">
               <a:rPr lang="en-US" smtClean="0"/>
-              <a:t>9/3/2021</a:t>
+              <a:t>9/10/2021</a:t>
             </a:fld>
             <a:endParaRPr lang="en-US" dirty="0"/>
           </a:p>
@@ -10034,7 +10640,7 @@
           <a:p>
             <a:fld id="{4CD73815-2707-4475-8F1A-B873CB631BB4}" type="datetimeFigureOut">
               <a:rPr lang="en-US" smtClean="0"/>
-              <a:t>9/3/2021</a:t>
+              <a:t>9/10/2021</a:t>
             </a:fld>
             <a:endParaRPr lang="en-US" dirty="0"/>
           </a:p>
@@ -10242,7 +10848,7 @@
           <a:p>
             <a:fld id="{2A4AFB99-0EAB-4182-AFF8-E214C82A68F6}" type="datetimeFigureOut">
               <a:rPr lang="en-US" smtClean="0"/>
-              <a:t>9/3/2021</a:t>
+              <a:t>9/10/2021</a:t>
             </a:fld>
             <a:endParaRPr lang="en-US" dirty="0"/>
           </a:p>
@@ -10440,7 +11046,7 @@
           <a:p>
             <a:fld id="{A5D3794B-289A-4A80-97D7-111025398D45}" type="datetimeFigureOut">
               <a:rPr lang="en-US" smtClean="0"/>
-              <a:t>9/3/2021</a:t>
+              <a:t>9/10/2021</a:t>
             </a:fld>
             <a:endParaRPr lang="en-US" dirty="0"/>
           </a:p>
@@ -10715,7 +11321,7 @@
           <a:p>
             <a:fld id="{5A61015F-7CC6-4D0A-9D87-873EA4C304CC}" type="datetimeFigureOut">
               <a:rPr lang="en-US" smtClean="0"/>
-              <a:t>9/3/2021</a:t>
+              <a:t>9/10/2021</a:t>
             </a:fld>
             <a:endParaRPr lang="en-US" dirty="0"/>
           </a:p>
@@ -10980,7 +11586,7 @@
           <a:p>
             <a:fld id="{93C6A301-0538-44EC-B09D-202E1042A48B}" type="datetimeFigureOut">
               <a:rPr lang="en-US" smtClean="0"/>
-              <a:t>9/3/2021</a:t>
+              <a:t>9/10/2021</a:t>
             </a:fld>
             <a:endParaRPr lang="en-US" dirty="0"/>
           </a:p>
@@ -11392,7 +11998,7 @@
           <a:p>
             <a:fld id="{D789574A-8875-45EF-8EA2-3CAA0F7ABC4C}" type="datetimeFigureOut">
               <a:rPr lang="en-US" smtClean="0"/>
-              <a:t>9/3/2021</a:t>
+              <a:t>9/10/2021</a:t>
             </a:fld>
             <a:endParaRPr lang="en-US" dirty="0"/>
           </a:p>
@@ -11533,7 +12139,7 @@
           <a:p>
             <a:fld id="{67EF4D4C-5367-4C26-9E2B-D8088D7FCA81}" type="datetimeFigureOut">
               <a:rPr lang="en-US" smtClean="0"/>
-              <a:t>9/3/2021</a:t>
+              <a:t>9/10/2021</a:t>
             </a:fld>
             <a:endParaRPr lang="en-US" dirty="0"/>
           </a:p>
@@ -11646,7 +12252,7 @@
           <a:p>
             <a:fld id="{56E91E96-98B0-4413-9547-46F3504108EF}" type="datetimeFigureOut">
               <a:rPr lang="en-US" smtClean="0"/>
-              <a:t>9/3/2021</a:t>
+              <a:t>9/10/2021</a:t>
             </a:fld>
             <a:endParaRPr lang="en-US" dirty="0"/>
           </a:p>
@@ -11957,7 +12563,7 @@
           <a:p>
             <a:fld id="{05C68B11-C5A8-448C-8CE9-B1A273C79CFC}" type="datetimeFigureOut">
               <a:rPr lang="en-US" smtClean="0"/>
-              <a:t>9/3/2021</a:t>
+              <a:t>9/10/2021</a:t>
             </a:fld>
             <a:endParaRPr lang="en-US" dirty="0"/>
           </a:p>
@@ -12246,7 +12852,7 @@
             <a:fld id="{90298CD5-6C1E-4009-B41F-6DF62E31D3BE}" type="datetimeFigureOut">
               <a:rPr lang="en-US" smtClean="0"/>
               <a:pPr/>
-              <a:t>9/3/2021</a:t>
+              <a:t>9/10/2021</a:t>
             </a:fld>
             <a:endParaRPr lang="en-US" dirty="0"/>
           </a:p>
@@ -12489,7 +13095,7 @@
             <a:fld id="{90298CD5-6C1E-4009-B41F-6DF62E31D3BE}" type="datetimeFigureOut">
               <a:rPr lang="en-US" smtClean="0"/>
               <a:pPr/>
-              <a:t>9/3/2021</a:t>
+              <a:t>9/10/2021</a:t>
             </a:fld>
             <a:endParaRPr lang="en-US" dirty="0"/>
           </a:p>
@@ -12977,7 +13583,7 @@
             <a:lstStyle/>
             <a:p>
               <a:pPr algn="ctr"/>
-              <a:endParaRPr lang="en-US"/>
+              <a:endParaRPr lang="en-US" dirty="0"/>
             </a:p>
           </p:txBody>
         </p:sp>
@@ -13187,6 +13793,77 @@
             <a:r>
               <a:rPr lang="pt-BR" dirty="0"/>
               <a:t>03/09/2021</a:t>
+            </a:r>
+          </a:p>
+        </p:txBody>
+      </p:sp>
+      <p:sp>
+        <p:nvSpPr>
+          <p:cNvPr id="8" name="Rectangle 7">
+            <a:extLst>
+              <a:ext uri="{FF2B5EF4-FFF2-40B4-BE49-F238E27FC236}">
+                <a16:creationId xmlns:a16="http://schemas.microsoft.com/office/drawing/2014/main" id="{BB07ECDC-D7DF-4360-BA92-31E6603C012E}"/>
+              </a:ext>
+            </a:extLst>
+          </p:cNvPr>
+          <p:cNvSpPr/>
+          <p:nvPr/>
+        </p:nvSpPr>
+        <p:spPr>
+          <a:xfrm>
+            <a:off x="6409249" y="5132285"/>
+            <a:ext cx="3293806" cy="1140542"/>
+          </a:xfrm>
+          <a:prstGeom prst="rect">
+            <a:avLst/>
+          </a:prstGeom>
+          <a:noFill/>
+          <a:ln w="38100">
+            <a:solidFill>
+              <a:srgbClr val="FF0000"/>
+            </a:solidFill>
+            <a:prstDash val="sysDot"/>
+          </a:ln>
+        </p:spPr>
+        <p:style>
+          <a:lnRef idx="2">
+            <a:schemeClr val="accent1">
+              <a:shade val="50000"/>
+            </a:schemeClr>
+          </a:lnRef>
+          <a:fillRef idx="1">
+            <a:schemeClr val="accent1"/>
+          </a:fillRef>
+          <a:effectRef idx="0">
+            <a:schemeClr val="accent1"/>
+          </a:effectRef>
+          <a:fontRef idx="minor">
+            <a:schemeClr val="lt1"/>
+          </a:fontRef>
+        </p:style>
+        <p:txBody>
+          <a:bodyPr rtlCol="0" anchor="ctr"/>
+          <a:lstStyle/>
+          <a:p>
+            <a:pPr algn="ctr"/>
+            <a:r>
+              <a:rPr lang="pt-BR" dirty="0">
+                <a:solidFill>
+                  <a:schemeClr val="tx1"/>
+                </a:solidFill>
+              </a:rPr>
+              <a:t>Quadro vermelho: </a:t>
+            </a:r>
+          </a:p>
+          <a:p>
+            <a:pPr algn="ctr"/>
+            <a:r>
+              <a:rPr lang="pt-BR" dirty="0">
+                <a:solidFill>
+                  <a:schemeClr val="tx1"/>
+                </a:solidFill>
+              </a:rPr>
+              <a:t>Destaca alterações da apresentação exibida em 03/set</a:t>
             </a:r>
           </a:p>
         </p:txBody>
@@ -15416,8 +16093,12 @@
           <a:p>
             <a:pPr algn="ctr"/>
             <a:r>
+              <a:rPr lang="pt-BR" u="sng" dirty="0"/>
+              <a:t>Sorteios enviesados </a:t>
+            </a:r>
+            <a:r>
               <a:rPr lang="pt-BR" dirty="0"/>
-              <a:t>Sorteios entre os </a:t>
+              <a:t>entre os </a:t>
             </a:r>
             <a:r>
               <a:rPr lang="pt-BR" dirty="0">
@@ -15445,7 +16126,7 @@
             </a:r>
             <a:r>
               <a:rPr lang="pt-BR" dirty="0"/>
-              <a:t> % melhores:</a:t>
+              <a:t> % melhores definem os competidores:</a:t>
             </a:r>
           </a:p>
         </p:txBody>
@@ -15464,8 +16145,8 @@
         </p:nvSpPr>
         <p:spPr>
           <a:xfrm>
-            <a:off x="6427634" y="2370081"/>
-            <a:ext cx="4544955" cy="472439"/>
+            <a:off x="6427634" y="2370080"/>
+            <a:ext cx="4697566" cy="700779"/>
           </a:xfrm>
           <a:prstGeom prst="rect">
             <a:avLst/>
@@ -15500,7 +16181,15 @@
             <a:pPr algn="ctr"/>
             <a:r>
               <a:rPr lang="pt-BR" dirty="0"/>
-              <a:t>Um sorteio já define qual o parente. </a:t>
+              <a:t>Um </a:t>
+            </a:r>
+            <a:r>
+              <a:rPr lang="pt-BR" u="sng" dirty="0"/>
+              <a:t>sorteio enviesado </a:t>
+            </a:r>
+            <a:r>
+              <a:rPr lang="pt-BR" dirty="0"/>
+              <a:t>define qual o parente. Viés controlado pela variável: </a:t>
             </a:r>
             <a:r>
               <a:rPr lang="pt-BR" dirty="0">
@@ -15853,6 +16542,177 @@
           </a:p>
         </p:txBody>
       </p:sp>
+      <p:sp>
+        <p:nvSpPr>
+          <p:cNvPr id="27" name="Rectangle 26">
+            <a:extLst>
+              <a:ext uri="{FF2B5EF4-FFF2-40B4-BE49-F238E27FC236}">
+                <a16:creationId xmlns:a16="http://schemas.microsoft.com/office/drawing/2014/main" id="{E349107F-3124-4A5A-B3F7-05F6C03727A7}"/>
+              </a:ext>
+            </a:extLst>
+          </p:cNvPr>
+          <p:cNvSpPr/>
+          <p:nvPr/>
+        </p:nvSpPr>
+        <p:spPr>
+          <a:xfrm>
+            <a:off x="7027968" y="2235707"/>
+            <a:ext cx="1791567" cy="327886"/>
+          </a:xfrm>
+          <a:prstGeom prst="rect">
+            <a:avLst/>
+          </a:prstGeom>
+          <a:noFill/>
+          <a:ln w="38100">
+            <a:solidFill>
+              <a:srgbClr val="FF0000"/>
+            </a:solidFill>
+            <a:prstDash val="sysDot"/>
+          </a:ln>
+        </p:spPr>
+        <p:style>
+          <a:lnRef idx="2">
+            <a:schemeClr val="accent1">
+              <a:shade val="50000"/>
+            </a:schemeClr>
+          </a:lnRef>
+          <a:fillRef idx="1">
+            <a:schemeClr val="accent1"/>
+          </a:fillRef>
+          <a:effectRef idx="0">
+            <a:schemeClr val="accent1"/>
+          </a:effectRef>
+          <a:fontRef idx="minor">
+            <a:schemeClr val="lt1"/>
+          </a:fontRef>
+        </p:style>
+        <p:txBody>
+          <a:bodyPr rtlCol="0" anchor="ctr"/>
+          <a:lstStyle/>
+          <a:p>
+            <a:pPr algn="ctr"/>
+            <a:endParaRPr lang="pt-BR" dirty="0">
+              <a:solidFill>
+                <a:schemeClr val="tx1"/>
+              </a:solidFill>
+            </a:endParaRPr>
+          </a:p>
+        </p:txBody>
+      </p:sp>
+      <p:sp>
+        <p:nvSpPr>
+          <p:cNvPr id="33" name="Rectangle 32">
+            <a:extLst>
+              <a:ext uri="{FF2B5EF4-FFF2-40B4-BE49-F238E27FC236}">
+                <a16:creationId xmlns:a16="http://schemas.microsoft.com/office/drawing/2014/main" id="{65909E4E-679C-4C4C-8E3A-4BEECC42DBB2}"/>
+              </a:ext>
+            </a:extLst>
+          </p:cNvPr>
+          <p:cNvSpPr/>
+          <p:nvPr/>
+        </p:nvSpPr>
+        <p:spPr>
+          <a:xfrm>
+            <a:off x="6427634" y="2581462"/>
+            <a:ext cx="1605321" cy="327886"/>
+          </a:xfrm>
+          <a:prstGeom prst="rect">
+            <a:avLst/>
+          </a:prstGeom>
+          <a:noFill/>
+          <a:ln w="38100">
+            <a:solidFill>
+              <a:srgbClr val="FF0000"/>
+            </a:solidFill>
+            <a:prstDash val="sysDot"/>
+          </a:ln>
+        </p:spPr>
+        <p:style>
+          <a:lnRef idx="2">
+            <a:schemeClr val="accent1">
+              <a:shade val="50000"/>
+            </a:schemeClr>
+          </a:lnRef>
+          <a:fillRef idx="1">
+            <a:schemeClr val="accent1"/>
+          </a:fillRef>
+          <a:effectRef idx="0">
+            <a:schemeClr val="accent1"/>
+          </a:effectRef>
+          <a:fontRef idx="minor">
+            <a:schemeClr val="lt1"/>
+          </a:fontRef>
+        </p:style>
+        <p:txBody>
+          <a:bodyPr rtlCol="0" anchor="ctr"/>
+          <a:lstStyle/>
+          <a:p>
+            <a:pPr algn="ctr"/>
+            <a:endParaRPr lang="pt-BR" dirty="0">
+              <a:solidFill>
+                <a:schemeClr val="tx1"/>
+              </a:solidFill>
+            </a:endParaRPr>
+          </a:p>
+        </p:txBody>
+      </p:sp>
+      <p:sp>
+        <p:nvSpPr>
+          <p:cNvPr id="34" name="Rectangle 33">
+            <a:extLst>
+              <a:ext uri="{FF2B5EF4-FFF2-40B4-BE49-F238E27FC236}">
+                <a16:creationId xmlns:a16="http://schemas.microsoft.com/office/drawing/2014/main" id="{74753CD7-4F68-447F-97D5-18D054E43142}"/>
+              </a:ext>
+            </a:extLst>
+          </p:cNvPr>
+          <p:cNvSpPr/>
+          <p:nvPr/>
+        </p:nvSpPr>
+        <p:spPr>
+          <a:xfrm>
+            <a:off x="443733" y="2305049"/>
+            <a:ext cx="1950267" cy="327886"/>
+          </a:xfrm>
+          <a:prstGeom prst="rect">
+            <a:avLst/>
+          </a:prstGeom>
+          <a:noFill/>
+          <a:ln w="38100">
+            <a:solidFill>
+              <a:srgbClr val="FF0000"/>
+            </a:solidFill>
+            <a:prstDash val="sysDot"/>
+          </a:ln>
+        </p:spPr>
+        <p:style>
+          <a:lnRef idx="2">
+            <a:schemeClr val="accent1">
+              <a:shade val="50000"/>
+            </a:schemeClr>
+          </a:lnRef>
+          <a:fillRef idx="1">
+            <a:schemeClr val="accent1"/>
+          </a:fillRef>
+          <a:effectRef idx="0">
+            <a:schemeClr val="accent1"/>
+          </a:effectRef>
+          <a:fontRef idx="minor">
+            <a:schemeClr val="lt1"/>
+          </a:fontRef>
+        </p:style>
+        <p:txBody>
+          <a:bodyPr rtlCol="0" anchor="ctr"/>
+          <a:lstStyle/>
+          <a:p>
+            <a:pPr algn="ctr"/>
+            <a:endParaRPr lang="pt-BR" dirty="0">
+              <a:solidFill>
+                <a:schemeClr val="tx1"/>
+              </a:solidFill>
+            </a:endParaRPr>
+          </a:p>
+        </p:txBody>
+      </p:sp>
     </p:spTree>
     <p:extLst>
       <p:ext uri="{BB962C8B-B14F-4D97-AF65-F5344CB8AC3E}">
@@ -16157,7 +17017,7 @@
             </a:r>
             <a:r>
               <a:rPr lang="pt-BR" dirty="0"/>
-              <a:t>/ tamanho do problema</a:t>
+              <a:t>/ tamanho do problema e é no máximo 50%</a:t>
             </a:r>
           </a:p>
           <a:p>
@@ -16245,6 +17105,63 @@
           </a:prstGeom>
         </p:spPr>
       </p:pic>
+      <p:sp>
+        <p:nvSpPr>
+          <p:cNvPr id="9" name="Rectangle 8">
+            <a:extLst>
+              <a:ext uri="{FF2B5EF4-FFF2-40B4-BE49-F238E27FC236}">
+                <a16:creationId xmlns:a16="http://schemas.microsoft.com/office/drawing/2014/main" id="{2D8964C8-90DD-4305-98A0-3898EAC2A307}"/>
+              </a:ext>
+            </a:extLst>
+          </p:cNvPr>
+          <p:cNvSpPr/>
+          <p:nvPr/>
+        </p:nvSpPr>
+        <p:spPr>
+          <a:xfrm>
+            <a:off x="8798180" y="2717202"/>
+            <a:ext cx="2038946" cy="492177"/>
+          </a:xfrm>
+          <a:prstGeom prst="rect">
+            <a:avLst/>
+          </a:prstGeom>
+          <a:noFill/>
+          <a:ln w="38100">
+            <a:solidFill>
+              <a:srgbClr val="FF0000"/>
+            </a:solidFill>
+            <a:prstDash val="sysDot"/>
+          </a:ln>
+        </p:spPr>
+        <p:style>
+          <a:lnRef idx="2">
+            <a:schemeClr val="accent1">
+              <a:shade val="50000"/>
+            </a:schemeClr>
+          </a:lnRef>
+          <a:fillRef idx="1">
+            <a:schemeClr val="accent1"/>
+          </a:fillRef>
+          <a:effectRef idx="0">
+            <a:schemeClr val="accent1"/>
+          </a:effectRef>
+          <a:fontRef idx="minor">
+            <a:schemeClr val="lt1"/>
+          </a:fontRef>
+        </p:style>
+        <p:txBody>
+          <a:bodyPr rtlCol="0" anchor="ctr"/>
+          <a:lstStyle/>
+          <a:p>
+            <a:pPr algn="ctr"/>
+            <a:endParaRPr lang="pt-BR" dirty="0">
+              <a:solidFill>
+                <a:schemeClr val="tx1"/>
+              </a:solidFill>
+            </a:endParaRPr>
+          </a:p>
+        </p:txBody>
+      </p:sp>
     </p:spTree>
     <p:extLst>
       <p:ext uri="{BB962C8B-B14F-4D97-AF65-F5344CB8AC3E}">
@@ -16954,6 +17871,63 @@
           </a:prstGeom>
         </p:spPr>
       </p:pic>
+      <p:sp>
+        <p:nvSpPr>
+          <p:cNvPr id="10" name="Rectangle 9">
+            <a:extLst>
+              <a:ext uri="{FF2B5EF4-FFF2-40B4-BE49-F238E27FC236}">
+                <a16:creationId xmlns:a16="http://schemas.microsoft.com/office/drawing/2014/main" id="{7799D3B7-A502-4834-AD31-774BB4E21E61}"/>
+              </a:ext>
+            </a:extLst>
+          </p:cNvPr>
+          <p:cNvSpPr/>
+          <p:nvPr/>
+        </p:nvSpPr>
+        <p:spPr>
+          <a:xfrm>
+            <a:off x="0" y="0"/>
+            <a:ext cx="12192000" cy="6858000"/>
+          </a:xfrm>
+          <a:prstGeom prst="rect">
+            <a:avLst/>
+          </a:prstGeom>
+          <a:noFill/>
+          <a:ln w="38100">
+            <a:solidFill>
+              <a:srgbClr val="FF0000"/>
+            </a:solidFill>
+            <a:prstDash val="sysDot"/>
+          </a:ln>
+        </p:spPr>
+        <p:style>
+          <a:lnRef idx="2">
+            <a:schemeClr val="accent1">
+              <a:shade val="50000"/>
+            </a:schemeClr>
+          </a:lnRef>
+          <a:fillRef idx="1">
+            <a:schemeClr val="accent1"/>
+          </a:fillRef>
+          <a:effectRef idx="0">
+            <a:schemeClr val="accent1"/>
+          </a:effectRef>
+          <a:fontRef idx="minor">
+            <a:schemeClr val="lt1"/>
+          </a:fontRef>
+        </p:style>
+        <p:txBody>
+          <a:bodyPr rtlCol="0" anchor="ctr"/>
+          <a:lstStyle/>
+          <a:p>
+            <a:pPr algn="ctr"/>
+            <a:endParaRPr lang="pt-BR" dirty="0">
+              <a:solidFill>
+                <a:schemeClr val="tx1"/>
+              </a:solidFill>
+            </a:endParaRPr>
+          </a:p>
+        </p:txBody>
+      </p:sp>
     </p:spTree>
     <p:extLst>
       <p:ext uri="{BB962C8B-B14F-4D97-AF65-F5344CB8AC3E}">
@@ -17219,7 +18193,7 @@
         </p:spPr>
         <p:txBody>
           <a:bodyPr>
-            <a:normAutofit/>
+            <a:normAutofit lnSpcReduction="10000"/>
           </a:bodyPr>
           <a:lstStyle/>
           <a:p>
@@ -17251,7 +18225,7 @@
             </a:r>
             <a:r>
               <a:rPr lang="pt-BR" dirty="0"/>
-              <a:t>”: [0.2, 1, 5]; </a:t>
+              <a:t>”: [0.1, 1, 10]; </a:t>
             </a:r>
           </a:p>
           <a:p>
@@ -17300,7 +18274,7 @@
             </a:pPr>
             <a:r>
               <a:rPr lang="pt-BR" dirty="0"/>
-              <a:t>Foram testados no problema 3 de 200 unidades, com todos h;</a:t>
+              <a:t>Foram testados nos problemas [3 e 7] de cada tamanho, com todos h;</a:t>
             </a:r>
           </a:p>
           <a:p>
@@ -17309,7 +18283,15 @@
             </a:pPr>
             <a:r>
               <a:rPr lang="pt-BR" dirty="0"/>
-              <a:t>Foram rodados 6 vezes.</a:t>
+              <a:t>A </a:t>
+            </a:r>
+            <a:r>
+              <a:rPr lang="pt-BR" dirty="0" err="1"/>
+              <a:t>Metaheurística</a:t>
+            </a:r>
+            <a:r>
+              <a:rPr lang="pt-BR" dirty="0"/>
+              <a:t> foi repetida 3 vezes e o valor considerado foi a média das 3 repetições.</a:t>
             </a:r>
           </a:p>
           <a:p>
@@ -17526,6 +18508,120 @@
           <a:p>
             <a:pPr algn="ctr"/>
             <a:endParaRPr lang="pt-BR"/>
+          </a:p>
+        </p:txBody>
+      </p:sp>
+      <p:sp>
+        <p:nvSpPr>
+          <p:cNvPr id="16" name="Rectangle 15">
+            <a:extLst>
+              <a:ext uri="{FF2B5EF4-FFF2-40B4-BE49-F238E27FC236}">
+                <a16:creationId xmlns:a16="http://schemas.microsoft.com/office/drawing/2014/main" id="{A6B9629E-2295-4608-B3F7-757790479999}"/>
+              </a:ext>
+            </a:extLst>
+          </p:cNvPr>
+          <p:cNvSpPr/>
+          <p:nvPr/>
+        </p:nvSpPr>
+        <p:spPr>
+          <a:xfrm>
+            <a:off x="768197" y="4635295"/>
+            <a:ext cx="10686384" cy="1254228"/>
+          </a:xfrm>
+          <a:prstGeom prst="rect">
+            <a:avLst/>
+          </a:prstGeom>
+          <a:noFill/>
+          <a:ln w="38100">
+            <a:solidFill>
+              <a:srgbClr val="FF0000"/>
+            </a:solidFill>
+            <a:prstDash val="sysDot"/>
+          </a:ln>
+        </p:spPr>
+        <p:style>
+          <a:lnRef idx="2">
+            <a:schemeClr val="accent1">
+              <a:shade val="50000"/>
+            </a:schemeClr>
+          </a:lnRef>
+          <a:fillRef idx="1">
+            <a:schemeClr val="accent1"/>
+          </a:fillRef>
+          <a:effectRef idx="0">
+            <a:schemeClr val="accent1"/>
+          </a:effectRef>
+          <a:fontRef idx="minor">
+            <a:schemeClr val="lt1"/>
+          </a:fontRef>
+        </p:style>
+        <p:txBody>
+          <a:bodyPr rtlCol="0" anchor="ctr"/>
+          <a:lstStyle/>
+          <a:p>
+            <a:pPr algn="ctr"/>
+            <a:endParaRPr lang="pt-BR" dirty="0">
+              <a:solidFill>
+                <a:schemeClr val="tx1"/>
+              </a:solidFill>
+            </a:endParaRPr>
+          </a:p>
+        </p:txBody>
+      </p:sp>
+      <p:sp>
+        <p:nvSpPr>
+          <p:cNvPr id="17" name="Rectangle 16">
+            <a:extLst>
+              <a:ext uri="{FF2B5EF4-FFF2-40B4-BE49-F238E27FC236}">
+                <a16:creationId xmlns:a16="http://schemas.microsoft.com/office/drawing/2014/main" id="{C5D2F7D2-F119-41E1-9A67-D1A545EC4D4E}"/>
+              </a:ext>
+            </a:extLst>
+          </p:cNvPr>
+          <p:cNvSpPr/>
+          <p:nvPr/>
+        </p:nvSpPr>
+        <p:spPr>
+          <a:xfrm>
+            <a:off x="4293062" y="2747066"/>
+            <a:ext cx="1866206" cy="487747"/>
+          </a:xfrm>
+          <a:prstGeom prst="rect">
+            <a:avLst/>
+          </a:prstGeom>
+          <a:noFill/>
+          <a:ln w="38100">
+            <a:solidFill>
+              <a:srgbClr val="FF0000"/>
+            </a:solidFill>
+            <a:prstDash val="sysDot"/>
+          </a:ln>
+        </p:spPr>
+        <p:style>
+          <a:lnRef idx="2">
+            <a:schemeClr val="accent1">
+              <a:shade val="50000"/>
+            </a:schemeClr>
+          </a:lnRef>
+          <a:fillRef idx="1">
+            <a:schemeClr val="accent1"/>
+          </a:fillRef>
+          <a:effectRef idx="0">
+            <a:schemeClr val="accent1"/>
+          </a:effectRef>
+          <a:fontRef idx="minor">
+            <a:schemeClr val="lt1"/>
+          </a:fontRef>
+        </p:style>
+        <p:txBody>
+          <a:bodyPr rtlCol="0" anchor="ctr"/>
+          <a:lstStyle/>
+          <a:p>
+            <a:pPr algn="ctr"/>
+            <a:endParaRPr lang="pt-BR" dirty="0">
+              <a:solidFill>
+                <a:schemeClr val="tx1"/>
+              </a:solidFill>
+            </a:endParaRPr>
           </a:p>
         </p:txBody>
       </p:sp>
@@ -18183,7 +19279,15 @@
           <a:p>
             <a:r>
               <a:rPr lang="pt-BR" dirty="0"/>
-              <a:t>Resultados – Parametrização – Quanto ao obj.</a:t>
+              <a:t>Resultados – Parametrização – Quanto ao </a:t>
+            </a:r>
+            <a:r>
+              <a:rPr lang="pt-BR" dirty="0" err="1"/>
+              <a:t>obj</a:t>
+            </a:r>
+            <a:r>
+              <a:rPr lang="pt-BR" dirty="0"/>
+              <a:t>.</a:t>
             </a:r>
           </a:p>
         </p:txBody>
@@ -18221,14 +19325,25 @@
             </a:pPr>
             <a:r>
               <a:rPr lang="pt-BR" b="1" dirty="0"/>
-              <a:t>Taxa mutação                                           Taxa elitismo, apenas para h=0.6</a:t>
+              <a:t>Taxa </a:t>
+            </a:r>
+            <a:r>
+              <a:rPr lang="pt-BR" b="1" dirty="0" err="1"/>
+              <a:t>elitistimo</a:t>
+            </a:r>
+            <a:r>
+              <a:rPr lang="pt-BR" b="1" dirty="0"/>
+              <a:t>, h=0,2</a:t>
             </a:r>
           </a:p>
           <a:p>
             <a:pPr marL="0" indent="0">
               <a:buNone/>
             </a:pPr>
-            <a:endParaRPr lang="pt-BR" b="1" dirty="0"/>
+            <a:r>
+              <a:rPr lang="pt-BR" b="1" dirty="0"/>
+              <a:t>200 serviços                                                    1000 serviços</a:t>
+            </a:r>
           </a:p>
           <a:p>
             <a:pPr marL="0" indent="0">
@@ -18252,104 +19367,70 @@
       </p:sp>
       <p:pic>
         <p:nvPicPr>
-          <p:cNvPr id="4102" name="Picture 6">
+          <p:cNvPr id="4" name="Picture 3">
             <a:extLst>
               <a:ext uri="{FF2B5EF4-FFF2-40B4-BE49-F238E27FC236}">
-                <a16:creationId xmlns:a16="http://schemas.microsoft.com/office/drawing/2014/main" id="{450808F1-C85B-4A65-8D52-47C90E602FCD}"/>
+                <a16:creationId xmlns:a16="http://schemas.microsoft.com/office/drawing/2014/main" id="{335543AC-7B73-4F36-B455-8A750DEB05BE}"/>
               </a:ext>
             </a:extLst>
           </p:cNvPr>
           <p:cNvPicPr>
-            <a:picLocks noChangeAspect="1" noChangeArrowheads="1"/>
+            <a:picLocks noChangeAspect="1"/>
           </p:cNvPicPr>
           <p:nvPr/>
         </p:nvPicPr>
         <p:blipFill>
-          <a:blip r:embed="rId2">
-            <a:extLst>
-              <a:ext uri="{28A0092B-C50C-407E-A947-70E740481C1C}">
-                <a14:useLocalDpi xmlns:a14="http://schemas.microsoft.com/office/drawing/2010/main" val="0"/>
-              </a:ext>
-            </a:extLst>
-          </a:blip>
-          <a:srcRect/>
+          <a:blip r:embed="rId2"/>
           <a:stretch>
             <a:fillRect/>
           </a:stretch>
         </p:blipFill>
-        <p:spPr bwMode="auto">
+        <p:spPr>
           <a:xfrm>
-            <a:off x="236882" y="2295629"/>
-            <a:ext cx="5684374" cy="3592409"/>
+            <a:off x="-16981" y="2686220"/>
+            <a:ext cx="6391275" cy="3886200"/>
           </a:xfrm>
           <a:prstGeom prst="rect">
             <a:avLst/>
           </a:prstGeom>
-          <a:noFill/>
-          <a:extLst>
-            <a:ext uri="{909E8E84-426E-40DD-AFC4-6F175D3DCCD1}">
-              <a14:hiddenFill xmlns:a14="http://schemas.microsoft.com/office/drawing/2010/main">
-                <a:solidFill>
-                  <a:srgbClr val="FFFFFF"/>
-                </a:solidFill>
-              </a14:hiddenFill>
-            </a:ext>
-          </a:extLst>
         </p:spPr>
       </p:pic>
       <p:pic>
         <p:nvPicPr>
-          <p:cNvPr id="4104" name="Picture 8">
+          <p:cNvPr id="6" name="Picture 5">
             <a:extLst>
               <a:ext uri="{FF2B5EF4-FFF2-40B4-BE49-F238E27FC236}">
-                <a16:creationId xmlns:a16="http://schemas.microsoft.com/office/drawing/2014/main" id="{EB2C041E-A706-48CA-86A0-25BAACDD7635}"/>
+                <a16:creationId xmlns:a16="http://schemas.microsoft.com/office/drawing/2014/main" id="{EF31DE24-1A71-4602-9C45-73EC034329FE}"/>
               </a:ext>
             </a:extLst>
           </p:cNvPr>
           <p:cNvPicPr>
-            <a:picLocks noChangeAspect="1" noChangeArrowheads="1"/>
+            <a:picLocks noChangeAspect="1"/>
           </p:cNvPicPr>
           <p:nvPr/>
         </p:nvPicPr>
         <p:blipFill>
-          <a:blip r:embed="rId3">
-            <a:extLst>
-              <a:ext uri="{28A0092B-C50C-407E-A947-70E740481C1C}">
-                <a14:useLocalDpi xmlns:a14="http://schemas.microsoft.com/office/drawing/2010/main" val="0"/>
-              </a:ext>
-            </a:extLst>
-          </a:blip>
-          <a:srcRect/>
+          <a:blip r:embed="rId3"/>
           <a:stretch>
             <a:fillRect/>
           </a:stretch>
         </p:blipFill>
-        <p:spPr bwMode="auto">
+        <p:spPr>
           <a:xfrm>
-            <a:off x="6096000" y="2220700"/>
-            <a:ext cx="5553228" cy="3804990"/>
+            <a:off x="6145504" y="2686221"/>
+            <a:ext cx="6001756" cy="3941592"/>
           </a:xfrm>
           <a:prstGeom prst="rect">
             <a:avLst/>
           </a:prstGeom>
-          <a:noFill/>
-          <a:extLst>
-            <a:ext uri="{909E8E84-426E-40DD-AFC4-6F175D3DCCD1}">
-              <a14:hiddenFill xmlns:a14="http://schemas.microsoft.com/office/drawing/2010/main">
-                <a:solidFill>
-                  <a:srgbClr val="FFFFFF"/>
-                </a:solidFill>
-              </a14:hiddenFill>
-            </a:ext>
-          </a:extLst>
         </p:spPr>
       </p:pic>
       <p:sp>
         <p:nvSpPr>
-          <p:cNvPr id="5" name="Rectangle 4">
+          <p:cNvPr id="14" name="Rectangle 13">
             <a:extLst>
               <a:ext uri="{FF2B5EF4-FFF2-40B4-BE49-F238E27FC236}">
-                <a16:creationId xmlns:a16="http://schemas.microsoft.com/office/drawing/2014/main" id="{FED1AEDF-2126-4769-8926-17B211F13ACA}"/>
+                <a16:creationId xmlns:a16="http://schemas.microsoft.com/office/drawing/2014/main" id="{20659F7E-1DA6-4BC5-BE55-23D2F3045DBF}"/>
               </a:ext>
             </a:extLst>
           </p:cNvPr>
@@ -18358,17 +19439,19 @@
         </p:nvSpPr>
         <p:spPr>
           <a:xfrm>
-            <a:off x="6479458" y="2220700"/>
-            <a:ext cx="1248697" cy="296358"/>
+            <a:off x="44740" y="68826"/>
+            <a:ext cx="12102520" cy="6789174"/>
           </a:xfrm>
           <a:prstGeom prst="rect">
             <a:avLst/>
           </a:prstGeom>
-          <a:solidFill>
-            <a:srgbClr val="4472C4">
-              <a:alpha val="25882"/>
-            </a:srgbClr>
-          </a:solidFill>
+          <a:noFill/>
+          <a:ln w="38100">
+            <a:solidFill>
+              <a:srgbClr val="FF0000"/>
+            </a:solidFill>
+            <a:prstDash val="sysDot"/>
+          </a:ln>
         </p:spPr>
         <p:style>
           <a:lnRef idx="2">
@@ -18391,14 +19474,18 @@
           <a:lstStyle/>
           <a:p>
             <a:pPr algn="ctr"/>
-            <a:endParaRPr lang="pt-BR"/>
+            <a:endParaRPr lang="pt-BR" dirty="0">
+              <a:solidFill>
+                <a:schemeClr val="tx1"/>
+              </a:solidFill>
+            </a:endParaRPr>
           </a:p>
         </p:txBody>
       </p:sp>
     </p:spTree>
     <p:extLst>
       <p:ext uri="{BB962C8B-B14F-4D97-AF65-F5344CB8AC3E}">
-        <p14:creationId xmlns:p14="http://schemas.microsoft.com/office/powerpoint/2010/main" val="1636379934"/>
+        <p14:creationId xmlns:p14="http://schemas.microsoft.com/office/powerpoint/2010/main" val="2514932616"/>
       </p:ext>
     </p:extLst>
   </p:cSld>
@@ -19229,6 +20316,516 @@
         </p:nvSpPr>
         <p:spPr>
           <a:xfrm>
+            <a:off x="685255" y="1674352"/>
+            <a:ext cx="12127398" cy="4351338"/>
+          </a:xfrm>
+        </p:spPr>
+        <p:txBody>
+          <a:bodyPr>
+            <a:normAutofit/>
+          </a:bodyPr>
+          <a:lstStyle/>
+          <a:p>
+            <a:pPr marL="0" indent="0">
+              <a:buNone/>
+            </a:pPr>
+            <a:r>
+              <a:rPr lang="pt-BR" b="1" dirty="0"/>
+              <a:t>Taxa mutação  (padrão se mantém para outros “</a:t>
+            </a:r>
+            <a:r>
+              <a:rPr lang="pt-BR" b="1" dirty="0" err="1"/>
+              <a:t>h”s</a:t>
+            </a:r>
+            <a:r>
+              <a:rPr lang="pt-BR" b="1" dirty="0"/>
+              <a:t> e outros tamanhos)</a:t>
+            </a:r>
+          </a:p>
+          <a:p>
+            <a:pPr marL="0" indent="0">
+              <a:buNone/>
+            </a:pPr>
+            <a:r>
+              <a:rPr lang="pt-BR" b="1" dirty="0"/>
+              <a:t>h=1000 serviços                                                          50 serviços</a:t>
+            </a:r>
+          </a:p>
+          <a:p>
+            <a:pPr marL="0" indent="0">
+              <a:buNone/>
+            </a:pPr>
+            <a:endParaRPr lang="pt-BR" b="1" dirty="0"/>
+          </a:p>
+          <a:p>
+            <a:pPr marL="0" indent="0">
+              <a:buNone/>
+            </a:pPr>
+            <a:endParaRPr lang="pt-BR" b="1" dirty="0"/>
+          </a:p>
+          <a:p>
+            <a:pPr marL="0" indent="0">
+              <a:buNone/>
+            </a:pPr>
+            <a:endParaRPr lang="pt-BR" b="1" dirty="0"/>
+          </a:p>
+          <a:p>
+            <a:pPr marL="0" indent="0">
+              <a:buNone/>
+            </a:pPr>
+            <a:endParaRPr lang="pt-BR" b="1" dirty="0"/>
+          </a:p>
+          <a:p>
+            <a:pPr marL="0" indent="0">
+              <a:buNone/>
+            </a:pPr>
+            <a:endParaRPr lang="pt-BR" b="1" dirty="0"/>
+          </a:p>
+        </p:txBody>
+      </p:sp>
+      <p:pic>
+        <p:nvPicPr>
+          <p:cNvPr id="4" name="Picture 3">
+            <a:extLst>
+              <a:ext uri="{FF2B5EF4-FFF2-40B4-BE49-F238E27FC236}">
+                <a16:creationId xmlns:a16="http://schemas.microsoft.com/office/drawing/2014/main" id="{910163C4-4FD3-4F9C-A5F0-ABD1A83A5A9A}"/>
+              </a:ext>
+            </a:extLst>
+          </p:cNvPr>
+          <p:cNvPicPr>
+            <a:picLocks noChangeAspect="1"/>
+          </p:cNvPicPr>
+          <p:nvPr/>
+        </p:nvPicPr>
+        <p:blipFill>
+          <a:blip r:embed="rId3"/>
+          <a:stretch>
+            <a:fillRect/>
+          </a:stretch>
+        </p:blipFill>
+        <p:spPr>
+          <a:xfrm>
+            <a:off x="0" y="2659984"/>
+            <a:ext cx="5781675" cy="3895725"/>
+          </a:xfrm>
+          <a:prstGeom prst="rect">
+            <a:avLst/>
+          </a:prstGeom>
+        </p:spPr>
+      </p:pic>
+      <p:pic>
+        <p:nvPicPr>
+          <p:cNvPr id="7" name="Picture 6">
+            <a:extLst>
+              <a:ext uri="{FF2B5EF4-FFF2-40B4-BE49-F238E27FC236}">
+                <a16:creationId xmlns:a16="http://schemas.microsoft.com/office/drawing/2014/main" id="{F80FF719-B7B0-4331-BCE1-23B556A80C85}"/>
+              </a:ext>
+            </a:extLst>
+          </p:cNvPr>
+          <p:cNvPicPr>
+            <a:picLocks noChangeAspect="1"/>
+          </p:cNvPicPr>
+          <p:nvPr/>
+        </p:nvPicPr>
+        <p:blipFill>
+          <a:blip r:embed="rId4"/>
+          <a:stretch>
+            <a:fillRect/>
+          </a:stretch>
+        </p:blipFill>
+        <p:spPr>
+          <a:xfrm>
+            <a:off x="5781675" y="2745708"/>
+            <a:ext cx="5943600" cy="3724275"/>
+          </a:xfrm>
+          <a:prstGeom prst="rect">
+            <a:avLst/>
+          </a:prstGeom>
+        </p:spPr>
+      </p:pic>
+      <p:sp>
+        <p:nvSpPr>
+          <p:cNvPr id="15" name="Rectangle 14">
+            <a:extLst>
+              <a:ext uri="{FF2B5EF4-FFF2-40B4-BE49-F238E27FC236}">
+                <a16:creationId xmlns:a16="http://schemas.microsoft.com/office/drawing/2014/main" id="{DD08367A-05A1-455E-A2F0-D3A62BBF32ED}"/>
+              </a:ext>
+            </a:extLst>
+          </p:cNvPr>
+          <p:cNvSpPr/>
+          <p:nvPr/>
+        </p:nvSpPr>
+        <p:spPr>
+          <a:xfrm>
+            <a:off x="64602" y="0"/>
+            <a:ext cx="12127398" cy="6858000"/>
+          </a:xfrm>
+          <a:prstGeom prst="rect">
+            <a:avLst/>
+          </a:prstGeom>
+          <a:noFill/>
+          <a:ln w="38100">
+            <a:solidFill>
+              <a:srgbClr val="FF0000"/>
+            </a:solidFill>
+            <a:prstDash val="sysDot"/>
+          </a:ln>
+        </p:spPr>
+        <p:style>
+          <a:lnRef idx="2">
+            <a:schemeClr val="accent1">
+              <a:shade val="50000"/>
+            </a:schemeClr>
+          </a:lnRef>
+          <a:fillRef idx="1">
+            <a:schemeClr val="accent1"/>
+          </a:fillRef>
+          <a:effectRef idx="0">
+            <a:schemeClr val="accent1"/>
+          </a:effectRef>
+          <a:fontRef idx="minor">
+            <a:schemeClr val="lt1"/>
+          </a:fontRef>
+        </p:style>
+        <p:txBody>
+          <a:bodyPr rtlCol="0" anchor="ctr"/>
+          <a:lstStyle/>
+          <a:p>
+            <a:pPr algn="ctr"/>
+            <a:endParaRPr lang="pt-BR" dirty="0">
+              <a:solidFill>
+                <a:schemeClr val="tx1"/>
+              </a:solidFill>
+            </a:endParaRPr>
+          </a:p>
+        </p:txBody>
+      </p:sp>
+      <p:sp>
+        <p:nvSpPr>
+          <p:cNvPr id="18" name="TextBox 17">
+            <a:extLst>
+              <a:ext uri="{FF2B5EF4-FFF2-40B4-BE49-F238E27FC236}">
+                <a16:creationId xmlns:a16="http://schemas.microsoft.com/office/drawing/2014/main" id="{A76E211B-E729-4D5C-AB95-D188FC2A6407}"/>
+              </a:ext>
+            </a:extLst>
+          </p:cNvPr>
+          <p:cNvSpPr txBox="1"/>
+          <p:nvPr/>
+        </p:nvSpPr>
+        <p:spPr>
+          <a:xfrm>
+            <a:off x="3776495" y="6455148"/>
+            <a:ext cx="8666521" cy="369332"/>
+          </a:xfrm>
+          <a:prstGeom prst="rect">
+            <a:avLst/>
+          </a:prstGeom>
+          <a:noFill/>
+        </p:spPr>
+        <p:txBody>
+          <a:bodyPr wrap="square">
+            <a:spAutoFit/>
+          </a:bodyPr>
+          <a:lstStyle/>
+          <a:p>
+            <a:pPr marL="0" indent="0">
+              <a:buNone/>
+            </a:pPr>
+            <a:r>
+              <a:rPr lang="pt-BR" b="1" dirty="0"/>
+              <a:t>  </a:t>
+            </a:r>
+            <a:r>
+              <a:rPr lang="pt-BR" sz="1800" b="1" dirty="0">
+                <a:solidFill>
+                  <a:srgbClr val="FF0000"/>
+                </a:solidFill>
+              </a:rPr>
+              <a:t>(valor indicado é a </a:t>
+            </a:r>
+            <a:r>
+              <a:rPr lang="pt-BR" sz="1800" b="1" dirty="0" err="1">
+                <a:solidFill>
+                  <a:srgbClr val="FF0000"/>
+                </a:solidFill>
+              </a:rPr>
+              <a:t>taxa_inicial</a:t>
+            </a:r>
+            <a:r>
+              <a:rPr lang="pt-BR" sz="1800" b="1" dirty="0">
+                <a:solidFill>
+                  <a:srgbClr val="FF0000"/>
+                </a:solidFill>
+              </a:rPr>
+              <a:t>/tamanho problema)</a:t>
+            </a:r>
+            <a:endParaRPr lang="pt-BR" b="1" dirty="0">
+              <a:solidFill>
+                <a:srgbClr val="FF0000"/>
+              </a:solidFill>
+            </a:endParaRPr>
+          </a:p>
+        </p:txBody>
+      </p:sp>
+    </p:spTree>
+    <p:extLst>
+      <p:ext uri="{BB962C8B-B14F-4D97-AF65-F5344CB8AC3E}">
+        <p14:creationId xmlns:p14="http://schemas.microsoft.com/office/powerpoint/2010/main" val="1636379934"/>
+      </p:ext>
+    </p:extLst>
+  </p:cSld>
+  <p:clrMapOvr>
+    <a:masterClrMapping/>
+  </p:clrMapOvr>
+</p:sld>
+</file>
+
+<file path=ppt/slides/slide21.xml><?xml version="1.0" encoding="utf-8"?>
+<p:sld xmlns:a="http://schemas.openxmlformats.org/drawingml/2006/main" xmlns:r="http://schemas.openxmlformats.org/officeDocument/2006/relationships" xmlns:p="http://schemas.openxmlformats.org/presentationml/2006/main">
+  <p:cSld>
+    <p:spTree>
+      <p:nvGrpSpPr>
+        <p:cNvPr id="1" name=""/>
+        <p:cNvGrpSpPr/>
+        <p:nvPr/>
+      </p:nvGrpSpPr>
+      <p:grpSpPr>
+        <a:xfrm>
+          <a:off x="0" y="0"/>
+          <a:ext cx="0" cy="0"/>
+          <a:chOff x="0" y="0"/>
+          <a:chExt cx="0" cy="0"/>
+        </a:xfrm>
+      </p:grpSpPr>
+      <p:grpSp>
+        <p:nvGrpSpPr>
+          <p:cNvPr id="9" name="Group 8">
+            <a:extLst>
+              <a:ext uri="{FF2B5EF4-FFF2-40B4-BE49-F238E27FC236}">
+                <a16:creationId xmlns:a16="http://schemas.microsoft.com/office/drawing/2014/main" id="{D8949790-9AEA-4D22-9A39-8F903E7223E3}"/>
+              </a:ext>
+            </a:extLst>
+          </p:cNvPr>
+          <p:cNvGrpSpPr/>
+          <p:nvPr/>
+        </p:nvGrpSpPr>
+        <p:grpSpPr>
+          <a:xfrm>
+            <a:off x="64602" y="230187"/>
+            <a:ext cx="12127398" cy="1068526"/>
+            <a:chOff x="64602" y="230187"/>
+            <a:chExt cx="12127398" cy="1068526"/>
+          </a:xfrm>
+        </p:grpSpPr>
+        <p:sp>
+          <p:nvSpPr>
+            <p:cNvPr id="10" name="Rectangle 9">
+              <a:extLst>
+                <a:ext uri="{FF2B5EF4-FFF2-40B4-BE49-F238E27FC236}">
+                  <a16:creationId xmlns:a16="http://schemas.microsoft.com/office/drawing/2014/main" id="{7BA50CD7-B4B2-44CF-8223-B66D2D4A5D71}"/>
+                </a:ext>
+              </a:extLst>
+            </p:cNvPr>
+            <p:cNvSpPr/>
+            <p:nvPr/>
+          </p:nvSpPr>
+          <p:spPr>
+            <a:xfrm>
+              <a:off x="556589" y="230188"/>
+              <a:ext cx="11635411" cy="1068525"/>
+            </a:xfrm>
+            <a:prstGeom prst="rect">
+              <a:avLst/>
+            </a:prstGeom>
+            <a:solidFill>
+              <a:schemeClr val="bg1">
+                <a:lumMod val="95000"/>
+              </a:schemeClr>
+            </a:solidFill>
+            <a:ln>
+              <a:noFill/>
+            </a:ln>
+          </p:spPr>
+          <p:style>
+            <a:lnRef idx="2">
+              <a:schemeClr val="accent1">
+                <a:shade val="50000"/>
+              </a:schemeClr>
+            </a:lnRef>
+            <a:fillRef idx="1">
+              <a:schemeClr val="accent1"/>
+            </a:fillRef>
+            <a:effectRef idx="0">
+              <a:schemeClr val="accent1"/>
+            </a:effectRef>
+            <a:fontRef idx="minor">
+              <a:schemeClr val="lt1"/>
+            </a:fontRef>
+          </p:style>
+          <p:txBody>
+            <a:bodyPr rtlCol="0" anchor="ctr"/>
+            <a:lstStyle/>
+            <a:p>
+              <a:pPr algn="ctr"/>
+              <a:endParaRPr lang="en-US"/>
+            </a:p>
+          </p:txBody>
+        </p:sp>
+        <p:sp>
+          <p:nvSpPr>
+            <p:cNvPr id="11" name="Rectangle 10">
+              <a:extLst>
+                <a:ext uri="{FF2B5EF4-FFF2-40B4-BE49-F238E27FC236}">
+                  <a16:creationId xmlns:a16="http://schemas.microsoft.com/office/drawing/2014/main" id="{404D19AD-A478-42BD-8029-C16F334FDF55}"/>
+                </a:ext>
+              </a:extLst>
+            </p:cNvPr>
+            <p:cNvSpPr/>
+            <p:nvPr/>
+          </p:nvSpPr>
+          <p:spPr>
+            <a:xfrm>
+              <a:off x="304799" y="230188"/>
+              <a:ext cx="172280" cy="1068525"/>
+            </a:xfrm>
+            <a:prstGeom prst="rect">
+              <a:avLst/>
+            </a:prstGeom>
+            <a:solidFill>
+              <a:schemeClr val="bg1">
+                <a:lumMod val="85000"/>
+              </a:schemeClr>
+            </a:solidFill>
+            <a:ln>
+              <a:noFill/>
+            </a:ln>
+          </p:spPr>
+          <p:style>
+            <a:lnRef idx="2">
+              <a:schemeClr val="accent1">
+                <a:shade val="50000"/>
+              </a:schemeClr>
+            </a:lnRef>
+            <a:fillRef idx="1">
+              <a:schemeClr val="accent1"/>
+            </a:fillRef>
+            <a:effectRef idx="0">
+              <a:schemeClr val="accent1"/>
+            </a:effectRef>
+            <a:fontRef idx="minor">
+              <a:schemeClr val="lt1"/>
+            </a:fontRef>
+          </p:style>
+          <p:txBody>
+            <a:bodyPr rtlCol="0" anchor="ctr"/>
+            <a:lstStyle/>
+            <a:p>
+              <a:pPr algn="ctr"/>
+              <a:endParaRPr lang="en-US"/>
+            </a:p>
+          </p:txBody>
+        </p:sp>
+        <p:sp>
+          <p:nvSpPr>
+            <p:cNvPr id="12" name="Rectangle 11">
+              <a:extLst>
+                <a:ext uri="{FF2B5EF4-FFF2-40B4-BE49-F238E27FC236}">
+                  <a16:creationId xmlns:a16="http://schemas.microsoft.com/office/drawing/2014/main" id="{EAF530B9-22B7-4025-8173-20A8873BD528}"/>
+                </a:ext>
+              </a:extLst>
+            </p:cNvPr>
+            <p:cNvSpPr/>
+            <p:nvPr/>
+          </p:nvSpPr>
+          <p:spPr>
+            <a:xfrm>
+              <a:off x="64602" y="230187"/>
+              <a:ext cx="172280" cy="1068525"/>
+            </a:xfrm>
+            <a:prstGeom prst="rect">
+              <a:avLst/>
+            </a:prstGeom>
+            <a:solidFill>
+              <a:schemeClr val="bg1">
+                <a:lumMod val="75000"/>
+              </a:schemeClr>
+            </a:solidFill>
+            <a:ln>
+              <a:noFill/>
+            </a:ln>
+          </p:spPr>
+          <p:style>
+            <a:lnRef idx="2">
+              <a:schemeClr val="accent1">
+                <a:shade val="50000"/>
+              </a:schemeClr>
+            </a:lnRef>
+            <a:fillRef idx="1">
+              <a:schemeClr val="accent1"/>
+            </a:fillRef>
+            <a:effectRef idx="0">
+              <a:schemeClr val="accent1"/>
+            </a:effectRef>
+            <a:fontRef idx="minor">
+              <a:schemeClr val="lt1"/>
+            </a:fontRef>
+          </p:style>
+          <p:txBody>
+            <a:bodyPr rtlCol="0" anchor="ctr"/>
+            <a:lstStyle/>
+            <a:p>
+              <a:pPr algn="ctr"/>
+              <a:endParaRPr lang="en-US"/>
+            </a:p>
+          </p:txBody>
+        </p:sp>
+      </p:grpSp>
+      <p:sp>
+        <p:nvSpPr>
+          <p:cNvPr id="2" name="Title 1">
+            <a:extLst>
+              <a:ext uri="{FF2B5EF4-FFF2-40B4-BE49-F238E27FC236}">
+                <a16:creationId xmlns:a16="http://schemas.microsoft.com/office/drawing/2014/main" id="{EE4EF513-2E75-4D8F-AF68-76E88508032E}"/>
+              </a:ext>
+            </a:extLst>
+          </p:cNvPr>
+          <p:cNvSpPr>
+            <a:spLocks noGrp="1"/>
+          </p:cNvSpPr>
+          <p:nvPr>
+            <p:ph type="title"/>
+          </p:nvPr>
+        </p:nvSpPr>
+        <p:spPr/>
+        <p:txBody>
+          <a:bodyPr/>
+          <a:lstStyle/>
+          <a:p>
+            <a:r>
+              <a:rPr lang="pt-BR" dirty="0"/>
+              <a:t>Resultados – Parametrização – Quanto ao obj.</a:t>
+            </a:r>
+          </a:p>
+        </p:txBody>
+      </p:sp>
+      <p:sp>
+        <p:nvSpPr>
+          <p:cNvPr id="13" name="Content Placeholder 2">
+            <a:extLst>
+              <a:ext uri="{FF2B5EF4-FFF2-40B4-BE49-F238E27FC236}">
+                <a16:creationId xmlns:a16="http://schemas.microsoft.com/office/drawing/2014/main" id="{82A047F9-7EF7-4200-B53B-BF10AC846F2D}"/>
+              </a:ext>
+            </a:extLst>
+          </p:cNvPr>
+          <p:cNvSpPr>
+            <a:spLocks noGrp="1"/>
+          </p:cNvSpPr>
+          <p:nvPr>
+            <p:ph idx="1"/>
+          </p:nvPr>
+        </p:nvSpPr>
+        <p:spPr>
+          <a:xfrm>
             <a:off x="911398" y="1674352"/>
             <a:ext cx="10515600" cy="4351338"/>
           </a:xfrm>
@@ -19366,7 +20963,7 @@
 </p:sld>
 </file>
 
-<file path=ppt/slides/slide21.xml><?xml version="1.0" encoding="utf-8"?>
+<file path=ppt/slides/slide22.xml><?xml version="1.0" encoding="utf-8"?>
 <p:sld xmlns:a="http://schemas.openxmlformats.org/drawingml/2006/main" xmlns:r="http://schemas.openxmlformats.org/officeDocument/2006/relationships" xmlns:p="http://schemas.openxmlformats.org/presentationml/2006/main">
   <p:cSld>
     <p:spTree>
@@ -19697,6 +21294,15 @@
             <a:pPr marL="0" indent="0">
               <a:buNone/>
             </a:pPr>
+            <a:r>
+              <a:rPr lang="pt-BR" dirty="0"/>
+              <a:t>Os parâmetros escolhidos foram confirmados pelo teste com mais instâncias e nos problemas de todos os tamanhos, mantendo a indiferença dos parâmetros no resultado,</a:t>
+            </a:r>
+          </a:p>
+          <a:p>
+            <a:pPr marL="0" indent="0">
+              <a:buNone/>
+            </a:pPr>
             <a:endParaRPr lang="pt-BR" b="1" dirty="0"/>
           </a:p>
           <a:p>
@@ -19719,6 +21325,63 @@
           </a:p>
         </p:txBody>
       </p:sp>
+      <p:sp>
+        <p:nvSpPr>
+          <p:cNvPr id="8" name="Rectangle 7">
+            <a:extLst>
+              <a:ext uri="{FF2B5EF4-FFF2-40B4-BE49-F238E27FC236}">
+                <a16:creationId xmlns:a16="http://schemas.microsoft.com/office/drawing/2014/main" id="{63F43ACF-066C-4C06-A313-8084684C7114}"/>
+              </a:ext>
+            </a:extLst>
+          </p:cNvPr>
+          <p:cNvSpPr/>
+          <p:nvPr/>
+        </p:nvSpPr>
+        <p:spPr>
+          <a:xfrm>
+            <a:off x="556589" y="4654959"/>
+            <a:ext cx="10327721" cy="1480370"/>
+          </a:xfrm>
+          <a:prstGeom prst="rect">
+            <a:avLst/>
+          </a:prstGeom>
+          <a:noFill/>
+          <a:ln w="38100">
+            <a:solidFill>
+              <a:srgbClr val="FF0000"/>
+            </a:solidFill>
+            <a:prstDash val="sysDot"/>
+          </a:ln>
+        </p:spPr>
+        <p:style>
+          <a:lnRef idx="2">
+            <a:schemeClr val="accent1">
+              <a:shade val="50000"/>
+            </a:schemeClr>
+          </a:lnRef>
+          <a:fillRef idx="1">
+            <a:schemeClr val="accent1"/>
+          </a:fillRef>
+          <a:effectRef idx="0">
+            <a:schemeClr val="accent1"/>
+          </a:effectRef>
+          <a:fontRef idx="minor">
+            <a:schemeClr val="lt1"/>
+          </a:fontRef>
+        </p:style>
+        <p:txBody>
+          <a:bodyPr rtlCol="0" anchor="ctr"/>
+          <a:lstStyle/>
+          <a:p>
+            <a:pPr algn="ctr"/>
+            <a:endParaRPr lang="pt-BR" dirty="0">
+              <a:solidFill>
+                <a:schemeClr val="tx1"/>
+              </a:solidFill>
+            </a:endParaRPr>
+          </a:p>
+        </p:txBody>
+      </p:sp>
     </p:spTree>
     <p:extLst>
       <p:ext uri="{BB962C8B-B14F-4D97-AF65-F5344CB8AC3E}">
@@ -19732,7 +21395,7 @@
 </p:sld>
 </file>
 
-<file path=ppt/slides/slide22.xml><?xml version="1.0" encoding="utf-8"?>
+<file path=ppt/slides/slide23.xml><?xml version="1.0" encoding="utf-8"?>
 <p:sld xmlns:a="http://schemas.openxmlformats.org/drawingml/2006/main" xmlns:r="http://schemas.openxmlformats.org/officeDocument/2006/relationships" xmlns:p="http://schemas.openxmlformats.org/presentationml/2006/main">
   <p:cSld>
     <p:spTree>
@@ -22689,7 +24352,7 @@
 </p:sld>
 </file>
 
-<file path=ppt/slides/slide23.xml><?xml version="1.0" encoding="utf-8"?>
+<file path=ppt/slides/slide24.xml><?xml version="1.0" encoding="utf-8"?>
 <p:sld xmlns:a="http://schemas.openxmlformats.org/drawingml/2006/main" xmlns:r="http://schemas.openxmlformats.org/officeDocument/2006/relationships" xmlns:p="http://schemas.openxmlformats.org/presentationml/2006/main">
   <p:cSld>
     <p:spTree>
@@ -29912,7 +31575,7 @@
 </p:sld>
 </file>
 
-<file path=ppt/slides/slide24.xml><?xml version="1.0" encoding="utf-8"?>
+<file path=ppt/slides/slide25.xml><?xml version="1.0" encoding="utf-8"?>
 <p:sld xmlns:a="http://schemas.openxmlformats.org/drawingml/2006/main" xmlns:r="http://schemas.openxmlformats.org/officeDocument/2006/relationships" xmlns:p="http://schemas.openxmlformats.org/presentationml/2006/main">
   <p:cSld>
     <p:spTree>
@@ -33114,7 +34777,7 @@
 </p:sld>
 </file>
 
-<file path=ppt/slides/slide25.xml><?xml version="1.0" encoding="utf-8"?>
+<file path=ppt/slides/slide26.xml><?xml version="1.0" encoding="utf-8"?>
 <p:sld xmlns:a="http://schemas.openxmlformats.org/drawingml/2006/main" xmlns:r="http://schemas.openxmlformats.org/officeDocument/2006/relationships" xmlns:p="http://schemas.openxmlformats.org/presentationml/2006/main">
   <p:cSld>
     <p:spTree>
@@ -34242,7 +35905,7 @@
 </p:sld>
 </file>
 
-<file path=ppt/slides/slide26.xml><?xml version="1.0" encoding="utf-8"?>
+<file path=ppt/slides/slide27.xml><?xml version="1.0" encoding="utf-8"?>
 <p:sld xmlns:a="http://schemas.openxmlformats.org/drawingml/2006/main" xmlns:r="http://schemas.openxmlformats.org/officeDocument/2006/relationships" xmlns:p="http://schemas.openxmlformats.org/presentationml/2006/main">
   <p:cSld>
     <p:spTree>
@@ -34569,6 +36232,63 @@
           </a:p>
         </p:txBody>
       </p:sp>
+      <p:sp>
+        <p:nvSpPr>
+          <p:cNvPr id="14" name="Rectangle 13">
+            <a:extLst>
+              <a:ext uri="{FF2B5EF4-FFF2-40B4-BE49-F238E27FC236}">
+                <a16:creationId xmlns:a16="http://schemas.microsoft.com/office/drawing/2014/main" id="{126AB4D2-08C7-407B-900D-02931D82E455}"/>
+              </a:ext>
+            </a:extLst>
+          </p:cNvPr>
+          <p:cNvSpPr/>
+          <p:nvPr/>
+        </p:nvSpPr>
+        <p:spPr>
+          <a:xfrm>
+            <a:off x="0" y="37238"/>
+            <a:ext cx="12192000" cy="6820761"/>
+          </a:xfrm>
+          <a:prstGeom prst="rect">
+            <a:avLst/>
+          </a:prstGeom>
+          <a:noFill/>
+          <a:ln w="38100">
+            <a:solidFill>
+              <a:srgbClr val="FF0000"/>
+            </a:solidFill>
+            <a:prstDash val="sysDot"/>
+          </a:ln>
+        </p:spPr>
+        <p:style>
+          <a:lnRef idx="2">
+            <a:schemeClr val="accent1">
+              <a:shade val="50000"/>
+            </a:schemeClr>
+          </a:lnRef>
+          <a:fillRef idx="1">
+            <a:schemeClr val="accent1"/>
+          </a:fillRef>
+          <a:effectRef idx="0">
+            <a:schemeClr val="accent1"/>
+          </a:effectRef>
+          <a:fontRef idx="minor">
+            <a:schemeClr val="lt1"/>
+          </a:fontRef>
+        </p:style>
+        <p:txBody>
+          <a:bodyPr rtlCol="0" anchor="ctr"/>
+          <a:lstStyle/>
+          <a:p>
+            <a:pPr algn="ctr"/>
+            <a:endParaRPr lang="pt-BR" dirty="0">
+              <a:solidFill>
+                <a:schemeClr val="tx1"/>
+              </a:solidFill>
+            </a:endParaRPr>
+          </a:p>
+        </p:txBody>
+      </p:sp>
     </p:spTree>
     <p:extLst>
       <p:ext uri="{BB962C8B-B14F-4D97-AF65-F5344CB8AC3E}">
@@ -34582,8 +36302,8 @@
 </p:sld>
 </file>
 
-<file path=ppt/slides/slide27.xml><?xml version="1.0" encoding="utf-8"?>
-<p:sld xmlns:a="http://schemas.openxmlformats.org/drawingml/2006/main" xmlns:r="http://schemas.openxmlformats.org/officeDocument/2006/relationships" xmlns:p="http://schemas.openxmlformats.org/presentationml/2006/main" show="0">
+<file path=ppt/slides/slide28.xml><?xml version="1.0" encoding="utf-8"?>
+<p:sld xmlns:a="http://schemas.openxmlformats.org/drawingml/2006/main" xmlns:r="http://schemas.openxmlformats.org/officeDocument/2006/relationships" xmlns:p="http://schemas.openxmlformats.org/presentationml/2006/main">
   <p:cSld>
     <p:spTree>
       <p:nvGrpSpPr>
@@ -34870,7 +36590,7 @@
 </p:sld>
 </file>
 
-<file path=ppt/slides/slide28.xml><?xml version="1.0" encoding="utf-8"?>
+<file path=ppt/slides/slide29.xml><?xml version="1.0" encoding="utf-8"?>
 <p:sld xmlns:a="http://schemas.openxmlformats.org/drawingml/2006/main" xmlns:r="http://schemas.openxmlformats.org/officeDocument/2006/relationships" xmlns:p="http://schemas.openxmlformats.org/presentationml/2006/main" show="0">
   <p:cSld>
     <p:spTree>
@@ -42153,4 +43873,299 @@
     </a:ext>
   </a:extLst>
 </a:theme>
+</file>
+
+<file path=ppt/theme/theme2.xml><?xml version="1.0" encoding="utf-8"?>
+<a:theme xmlns:a="http://schemas.openxmlformats.org/drawingml/2006/main" name="Office Theme">
+  <a:themeElements>
+    <a:clrScheme name="Office">
+      <a:dk1>
+        <a:sysClr val="windowText" lastClr="000000"/>
+      </a:dk1>
+      <a:lt1>
+        <a:sysClr val="window" lastClr="FFFFFF"/>
+      </a:lt1>
+      <a:dk2>
+        <a:srgbClr val="44546A"/>
+      </a:dk2>
+      <a:lt2>
+        <a:srgbClr val="E7E6E6"/>
+      </a:lt2>
+      <a:accent1>
+        <a:srgbClr val="4472C4"/>
+      </a:accent1>
+      <a:accent2>
+        <a:srgbClr val="ED7D31"/>
+      </a:accent2>
+      <a:accent3>
+        <a:srgbClr val="A5A5A5"/>
+      </a:accent3>
+      <a:accent4>
+        <a:srgbClr val="FFC000"/>
+      </a:accent4>
+      <a:accent5>
+        <a:srgbClr val="5B9BD5"/>
+      </a:accent5>
+      <a:accent6>
+        <a:srgbClr val="70AD47"/>
+      </a:accent6>
+      <a:hlink>
+        <a:srgbClr val="0563C1"/>
+      </a:hlink>
+      <a:folHlink>
+        <a:srgbClr val="954F72"/>
+      </a:folHlink>
+    </a:clrScheme>
+    <a:fontScheme name="Office">
+      <a:majorFont>
+        <a:latin typeface="Calibri Light" panose="020F0302020204030204"/>
+        <a:ea typeface=""/>
+        <a:cs typeface=""/>
+        <a:font script="Jpan" typeface="游ゴシック Light"/>
+        <a:font script="Hang" typeface="맑은 고딕"/>
+        <a:font script="Hans" typeface="等线 Light"/>
+        <a:font script="Hant" typeface="新細明體"/>
+        <a:font script="Arab" typeface="Times New Roman"/>
+        <a:font script="Hebr" typeface="Times New Roman"/>
+        <a:font script="Thai" typeface="Angsana New"/>
+        <a:font script="Ethi" typeface="Nyala"/>
+        <a:font script="Beng" typeface="Vrinda"/>
+        <a:font script="Gujr" typeface="Shruti"/>
+        <a:font script="Khmr" typeface="MoolBoran"/>
+        <a:font script="Knda" typeface="Tunga"/>
+        <a:font script="Guru" typeface="Raavi"/>
+        <a:font script="Cans" typeface="Euphemia"/>
+        <a:font script="Cher" typeface="Plantagenet Cherokee"/>
+        <a:font script="Yiii" typeface="Microsoft Yi Baiti"/>
+        <a:font script="Tibt" typeface="Microsoft Himalaya"/>
+        <a:font script="Thaa" typeface="MV Boli"/>
+        <a:font script="Deva" typeface="Mangal"/>
+        <a:font script="Telu" typeface="Gautami"/>
+        <a:font script="Taml" typeface="Latha"/>
+        <a:font script="Syrc" typeface="Estrangelo Edessa"/>
+        <a:font script="Orya" typeface="Kalinga"/>
+        <a:font script="Mlym" typeface="Kartika"/>
+        <a:font script="Laoo" typeface="DokChampa"/>
+        <a:font script="Sinh" typeface="Iskoola Pota"/>
+        <a:font script="Mong" typeface="Mongolian Baiti"/>
+        <a:font script="Viet" typeface="Times New Roman"/>
+        <a:font script="Uigh" typeface="Microsoft Uighur"/>
+        <a:font script="Geor" typeface="Sylfaen"/>
+        <a:font script="Armn" typeface="Arial"/>
+        <a:font script="Bugi" typeface="Leelawadee UI"/>
+        <a:font script="Bopo" typeface="Microsoft JhengHei"/>
+        <a:font script="Java" typeface="Javanese Text"/>
+        <a:font script="Lisu" typeface="Segoe UI"/>
+        <a:font script="Mymr" typeface="Myanmar Text"/>
+        <a:font script="Nkoo" typeface="Ebrima"/>
+        <a:font script="Olck" typeface="Nirmala UI"/>
+        <a:font script="Osma" typeface="Ebrima"/>
+        <a:font script="Phag" typeface="Phagspa"/>
+        <a:font script="Syrn" typeface="Estrangelo Edessa"/>
+        <a:font script="Syrj" typeface="Estrangelo Edessa"/>
+        <a:font script="Syre" typeface="Estrangelo Edessa"/>
+        <a:font script="Sora" typeface="Nirmala UI"/>
+        <a:font script="Tale" typeface="Microsoft Tai Le"/>
+        <a:font script="Talu" typeface="Microsoft New Tai Lue"/>
+        <a:font script="Tfng" typeface="Ebrima"/>
+      </a:majorFont>
+      <a:minorFont>
+        <a:latin typeface="Calibri" panose="020F0502020204030204"/>
+        <a:ea typeface=""/>
+        <a:cs typeface=""/>
+        <a:font script="Jpan" typeface="游ゴシック"/>
+        <a:font script="Hang" typeface="맑은 고딕"/>
+        <a:font script="Hans" typeface="等线"/>
+        <a:font script="Hant" typeface="新細明體"/>
+        <a:font script="Arab" typeface="Arial"/>
+        <a:font script="Hebr" typeface="Arial"/>
+        <a:font script="Thai" typeface="Cordia New"/>
+        <a:font script="Ethi" typeface="Nyala"/>
+        <a:font script="Beng" typeface="Vrinda"/>
+        <a:font script="Gujr" typeface="Shruti"/>
+        <a:font script="Khmr" typeface="DaunPenh"/>
+        <a:font script="Knda" typeface="Tunga"/>
+        <a:font script="Guru" typeface="Raavi"/>
+        <a:font script="Cans" typeface="Euphemia"/>
+        <a:font script="Cher" typeface="Plantagenet Cherokee"/>
+        <a:font script="Yiii" typeface="Microsoft Yi Baiti"/>
+        <a:font script="Tibt" typeface="Microsoft Himalaya"/>
+        <a:font script="Thaa" typeface="MV Boli"/>
+        <a:font script="Deva" typeface="Mangal"/>
+        <a:font script="Telu" typeface="Gautami"/>
+        <a:font script="Taml" typeface="Latha"/>
+        <a:font script="Syrc" typeface="Estrangelo Edessa"/>
+        <a:font script="Orya" typeface="Kalinga"/>
+        <a:font script="Mlym" typeface="Kartika"/>
+        <a:font script="Laoo" typeface="DokChampa"/>
+        <a:font script="Sinh" typeface="Iskoola Pota"/>
+        <a:font script="Mong" typeface="Mongolian Baiti"/>
+        <a:font script="Viet" typeface="Arial"/>
+        <a:font script="Uigh" typeface="Microsoft Uighur"/>
+        <a:font script="Geor" typeface="Sylfaen"/>
+        <a:font script="Armn" typeface="Arial"/>
+        <a:font script="Bugi" typeface="Leelawadee UI"/>
+        <a:font script="Bopo" typeface="Microsoft JhengHei"/>
+        <a:font script="Java" typeface="Javanese Text"/>
+        <a:font script="Lisu" typeface="Segoe UI"/>
+        <a:font script="Mymr" typeface="Myanmar Text"/>
+        <a:font script="Nkoo" typeface="Ebrima"/>
+        <a:font script="Olck" typeface="Nirmala UI"/>
+        <a:font script="Osma" typeface="Ebrima"/>
+        <a:font script="Phag" typeface="Phagspa"/>
+        <a:font script="Syrn" typeface="Estrangelo Edessa"/>
+        <a:font script="Syrj" typeface="Estrangelo Edessa"/>
+        <a:font script="Syre" typeface="Estrangelo Edessa"/>
+        <a:font script="Sora" typeface="Nirmala UI"/>
+        <a:font script="Tale" typeface="Microsoft Tai Le"/>
+        <a:font script="Talu" typeface="Microsoft New Tai Lue"/>
+        <a:font script="Tfng" typeface="Ebrima"/>
+      </a:minorFont>
+    </a:fontScheme>
+    <a:fmtScheme name="Office">
+      <a:fillStyleLst>
+        <a:solidFill>
+          <a:schemeClr val="phClr"/>
+        </a:solidFill>
+        <a:gradFill rotWithShape="1">
+          <a:gsLst>
+            <a:gs pos="0">
+              <a:schemeClr val="phClr">
+                <a:lumMod val="110000"/>
+                <a:satMod val="105000"/>
+                <a:tint val="67000"/>
+              </a:schemeClr>
+            </a:gs>
+            <a:gs pos="50000">
+              <a:schemeClr val="phClr">
+                <a:lumMod val="105000"/>
+                <a:satMod val="103000"/>
+                <a:tint val="73000"/>
+              </a:schemeClr>
+            </a:gs>
+            <a:gs pos="100000">
+              <a:schemeClr val="phClr">
+                <a:lumMod val="105000"/>
+                <a:satMod val="109000"/>
+                <a:tint val="81000"/>
+              </a:schemeClr>
+            </a:gs>
+          </a:gsLst>
+          <a:lin ang="5400000" scaled="0"/>
+        </a:gradFill>
+        <a:gradFill rotWithShape="1">
+          <a:gsLst>
+            <a:gs pos="0">
+              <a:schemeClr val="phClr">
+                <a:satMod val="103000"/>
+                <a:lumMod val="102000"/>
+                <a:tint val="94000"/>
+              </a:schemeClr>
+            </a:gs>
+            <a:gs pos="50000">
+              <a:schemeClr val="phClr">
+                <a:satMod val="110000"/>
+                <a:lumMod val="100000"/>
+                <a:shade val="100000"/>
+              </a:schemeClr>
+            </a:gs>
+            <a:gs pos="100000">
+              <a:schemeClr val="phClr">
+                <a:lumMod val="99000"/>
+                <a:satMod val="120000"/>
+                <a:shade val="78000"/>
+              </a:schemeClr>
+            </a:gs>
+          </a:gsLst>
+          <a:lin ang="5400000" scaled="0"/>
+        </a:gradFill>
+      </a:fillStyleLst>
+      <a:lnStyleLst>
+        <a:ln w="6350" cap="flat" cmpd="sng" algn="ctr">
+          <a:solidFill>
+            <a:schemeClr val="phClr"/>
+          </a:solidFill>
+          <a:prstDash val="solid"/>
+          <a:miter lim="800000"/>
+        </a:ln>
+        <a:ln w="12700" cap="flat" cmpd="sng" algn="ctr">
+          <a:solidFill>
+            <a:schemeClr val="phClr"/>
+          </a:solidFill>
+          <a:prstDash val="solid"/>
+          <a:miter lim="800000"/>
+        </a:ln>
+        <a:ln w="19050" cap="flat" cmpd="sng" algn="ctr">
+          <a:solidFill>
+            <a:schemeClr val="phClr"/>
+          </a:solidFill>
+          <a:prstDash val="solid"/>
+          <a:miter lim="800000"/>
+        </a:ln>
+      </a:lnStyleLst>
+      <a:effectStyleLst>
+        <a:effectStyle>
+          <a:effectLst/>
+        </a:effectStyle>
+        <a:effectStyle>
+          <a:effectLst/>
+        </a:effectStyle>
+        <a:effectStyle>
+          <a:effectLst>
+            <a:outerShdw blurRad="57150" dist="19050" dir="5400000" algn="ctr" rotWithShape="0">
+              <a:srgbClr val="000000">
+                <a:alpha val="63000"/>
+              </a:srgbClr>
+            </a:outerShdw>
+          </a:effectLst>
+        </a:effectStyle>
+      </a:effectStyleLst>
+      <a:bgFillStyleLst>
+        <a:solidFill>
+          <a:schemeClr val="phClr"/>
+        </a:solidFill>
+        <a:solidFill>
+          <a:schemeClr val="phClr">
+            <a:tint val="95000"/>
+            <a:satMod val="170000"/>
+          </a:schemeClr>
+        </a:solidFill>
+        <a:gradFill rotWithShape="1">
+          <a:gsLst>
+            <a:gs pos="0">
+              <a:schemeClr val="phClr">
+                <a:tint val="93000"/>
+                <a:satMod val="150000"/>
+                <a:shade val="98000"/>
+                <a:lumMod val="102000"/>
+              </a:schemeClr>
+            </a:gs>
+            <a:gs pos="50000">
+              <a:schemeClr val="phClr">
+                <a:tint val="98000"/>
+                <a:satMod val="130000"/>
+                <a:shade val="90000"/>
+                <a:lumMod val="103000"/>
+              </a:schemeClr>
+            </a:gs>
+            <a:gs pos="100000">
+              <a:schemeClr val="phClr">
+                <a:shade val="63000"/>
+                <a:satMod val="120000"/>
+              </a:schemeClr>
+            </a:gs>
+          </a:gsLst>
+          <a:lin ang="5400000" scaled="0"/>
+        </a:gradFill>
+      </a:bgFillStyleLst>
+    </a:fmtScheme>
+  </a:themeElements>
+  <a:objectDefaults/>
+  <a:extraClrSchemeLst/>
+  <a:extLst>
+    <a:ext uri="{05A4C25C-085E-4340-85A3-A5531E510DB2}">
+      <thm15:themeFamily xmlns:thm15="http://schemas.microsoft.com/office/thememl/2012/main" name="Office Theme" id="{62F939B6-93AF-4DB8-9C6B-D6C7DFDC589F}" vid="{4A3C46E8-61CC-4603-A589-7422A47A8E4A}"/>
+    </a:ext>
+  </a:extLst>
+</a:theme>
 </file>
</xml_diff>